<commit_message>
Up though unit 5 and lookg reasonable
</commit_message>
<xml_diff>
--- a/docs/lectures/lecture_05/05_01_lecture_powerpoint.pptx
+++ b/docs/lectures/lecture_05/05_01_lecture_powerpoint.pptx
@@ -4923,16 +4923,60 @@
             </a:pPr>
             <a:r>
               <a:rPr/>
-              <a:t>Covered - - Introduction to hypothesis testing - The standard normal distribution - Standard error - Confidence intervals - Student’s t-distribution - H testing - </a:t>
-            </a:r>
+              <a:t>Covered</a:t>
+            </a:r>
+          </a:p>
+          <a:p>
+            <a:pPr lvl="0"/>
+            <a:r>
+              <a:rPr/>
+              <a:t>Introduction to hypothesis testing</a:t>
+            </a:r>
+          </a:p>
+          <a:p>
+            <a:pPr lvl="0"/>
+            <a:r>
+              <a:rPr/>
+              <a:t>The standard normal distribution</a:t>
+            </a:r>
+          </a:p>
+          <a:p>
+            <a:pPr lvl="0"/>
+            <a:r>
+              <a:rPr/>
+              <a:t>Standard error</a:t>
+            </a:r>
+          </a:p>
+          <a:p>
+            <a:pPr lvl="0"/>
+            <a:r>
+              <a:rPr/>
+              <a:t>Confidence intervals</a:t>
+            </a:r>
+          </a:p>
+          <a:p>
+            <a:pPr lvl="0"/>
+            <a:r>
+              <a:rPr/>
+              <a:t>Student’s t-distribution</a:t>
+            </a:r>
+          </a:p>
+          <a:p>
+            <a:pPr lvl="0"/>
+            <a:r>
+              <a:rPr/>
+              <a:t>H testing</a:t>
+            </a:r>
+          </a:p>
+          <a:p>
+            <a:pPr lvl="0"/>
             <a:r>
               <a:rPr b="1"/>
               <a:t>One and Two Sample T Test</a:t>
             </a:r>
-            <a:r>
-              <a:rPr/>
-              <a:t> - </a:t>
-            </a:r>
+          </a:p>
+          <a:p>
+            <a:pPr lvl="0"/>
             <a:r>
               <a:rPr b="1"/>
               <a:t>p-values</a:t>

</xml_diff>

<commit_message>
been too long - up to lecture 13
</commit_message>
<xml_diff>
--- a/docs/lectures/lecture_05/05_01_lecture_powerpoint.pptx
+++ b/docs/lectures/lecture_05/05_01_lecture_powerpoint.pptx
@@ -41,10 +41,6 @@
     <p:sldId id="289" r:id="rId35"/>
     <p:sldId id="290" r:id="rId36"/>
     <p:sldId id="291" r:id="rId37"/>
-    <p:sldId id="292" r:id="rId38"/>
-    <p:sldId id="293" r:id="rId39"/>
-    <p:sldId id="294" r:id="rId40"/>
-    <p:sldId id="295" r:id="rId41"/>
   </p:sldIdLst>
   <p:sldSz cx="9144000" cy="5143500" type="screen16x9"/>
   <p:notesSz cx="6858000" cy="9144000"/>
@@ -3393,482 +3389,110 @@
       </p:grpSpPr>
       <p:sp>
         <p:nvSpPr>
-          <p:cNvPr id="2" name="Title 1"/>
-          <p:cNvSpPr>
-            <a:spLocks noGrp="1"/>
-          </p:cNvSpPr>
-          <p:nvPr>
-            <p:ph type="title"/>
-          </p:nvPr>
-        </p:nvSpPr>
-        <p:spPr>
-          <a:xfrm>
-            <a:off x="0" y="0"/>
-            <a:ext cx="9144000" cy="602780"/>
-          </a:xfrm>
-          <a:solidFill>
-            <a:srgbClr val="70121D"/>
-          </a:solidFill>
-        </p:spPr>
+          <p:cNvPr id="3" name="Content Placeholder 2"/>
+          <p:cNvSpPr>
+            <a:spLocks noGrp="1"/>
+          </p:cNvSpPr>
+          <p:nvPr>
+            <p:ph idx="1"/>
+          </p:nvPr>
+        </p:nvSpPr>
+        <p:spPr/>
         <p:txBody>
           <a:bodyPr/>
           <a:lstStyle/>
           <a:p>
-            <a:pPr lvl="0" indent="0" marL="0">
-              <a:buNone/>
-            </a:pPr>
-            <a:r>
-              <a:rPr b="1"/>
-              <a:t>Lecture 5:</a:t>
-            </a:r>
-            <a:r>
-              <a:rPr/>
-              <a:t> Understanding t-distribution</a:t>
-            </a:r>
-          </a:p>
-        </p:txBody>
-      </p:sp>
-      <p:sp>
-        <p:nvSpPr>
-          <p:cNvPr id="3" name="Content Placeholder 2"/>
-          <p:cNvSpPr>
-            <a:spLocks noGrp="1"/>
-          </p:cNvSpPr>
-          <p:nvPr>
-            <p:ph idx="1" sz="half"/>
-          </p:nvPr>
-        </p:nvSpPr>
-        <p:spPr/>
-        <p:txBody>
-          <a:bodyPr/>
-          <a:lstStyle/>
-          <a:p>
-            <a:pPr lvl="0" indent="0" marL="0">
-              <a:buNone/>
-            </a:pPr>
-            <a:r>
-              <a:rPr/>
-              <a:t>When sample sizes are small, the </a:t>
-            </a:r>
-            <a:r>
-              <a:rPr b="1"/>
-              <a:t>t-distribution</a:t>
-            </a:r>
-            <a:r>
-              <a:rPr/>
-              <a:t> is more appropriate than the normal distribution.</a:t>
-            </a:r>
-          </a:p>
-          <a:p>
-            <a:pPr lvl="0"/>
-            <a:r>
-              <a:rPr/>
-              <a:t>Similar to normal distribution but with heavier tails</a:t>
-            </a:r>
-          </a:p>
-          <a:p>
-            <a:pPr lvl="0"/>
-            <a:r>
-              <a:rPr/>
-              <a:t>Shape depends on </a:t>
-            </a:r>
-            <a:r>
-              <a:rPr b="1"/>
-              <a:t>degrees of freedom</a:t>
-            </a:r>
-            <a:r>
-              <a:rPr/>
-              <a:t> (df = n-1)</a:t>
-            </a:r>
-          </a:p>
-          <a:p>
-            <a:pPr lvl="0"/>
-            <a:r>
-              <a:rPr/>
-              <a:t>With large df (&gt;30), approaches the normal distribution</a:t>
-            </a:r>
-          </a:p>
-          <a:p>
-            <a:pPr lvl="0"/>
-            <a:r>
-              <a:rPr/>
-              <a:t>Used for:</a:t>
-            </a:r>
-          </a:p>
-          <a:p>
-            <a:pPr lvl="1"/>
-            <a:r>
-              <a:rPr/>
-              <a:t>Small sample sizes</a:t>
-            </a:r>
-          </a:p>
-          <a:p>
-            <a:pPr lvl="1"/>
-            <a:r>
-              <a:rPr/>
-              <a:t>When population standard deviation is unknown</a:t>
-            </a:r>
-          </a:p>
-          <a:p>
-            <a:pPr lvl="1"/>
-            <a:r>
-              <a:rPr/>
-              <a:t>Calculating confidence intervals</a:t>
-            </a:r>
-          </a:p>
-          <a:p>
-            <a:pPr lvl="1"/>
-            <a:r>
-              <a:rPr/>
-              <a:t>Conducting t-tests</a:t>
-            </a:r>
-          </a:p>
-        </p:txBody>
-      </p:sp>
-      <p:pic>
-        <p:nvPicPr>
-          <p:cNvPr descr="05_01_lecture_powerpoint_files/figure-pptx/unnamed-chunk-3-1.png" id="0" name="Picture 1"/>
-          <p:cNvPicPr>
-            <a:picLocks noGrp="1" noChangeAspect="1"/>
-          </p:cNvPicPr>
-          <p:nvPr/>
-        </p:nvPicPr>
-        <p:blipFill>
-          <a:blip r:embed="rId2"/>
-          <a:stretch>
-            <a:fillRect/>
-          </a:stretch>
-        </p:blipFill>
-        <p:spPr bwMode="auto">
-          <a:xfrm>
-            <a:off x="6121400" y="1333500"/>
-            <a:ext cx="2781300" cy="3124200"/>
-          </a:xfrm>
-          <a:prstGeom prst="rect">
-            <a:avLst/>
-          </a:prstGeom>
-          <a:noFill/>
-          <a:ln w="9525">
-            <a:noFill/>
-            <a:headEnd/>
-            <a:tailEnd/>
-          </a:ln>
-        </p:spPr>
-      </p:pic>
+            <a:pPr lvl="0" indent="0" marL="1270000">
+              <a:buNone/>
+            </a:pPr>
+            <a:r>
+              <a:rPr sz="2000" b="1"/>
+              <a:t>Practice Exercise 4: Using the t-distribution</a:t>
+            </a:r>
+          </a:p>
+          <a:p>
+            <a:pPr lvl="0" indent="0" marL="1270000">
+              <a:buNone/>
+            </a:pPr>
+            <a:r>
+              <a:rPr sz="2000"/>
+              <a:t>Let’s compare confidence intervals using the normal approximation (z) versus the t-distribution for our fish data.</a:t>
+            </a:r>
+          </a:p>
+          <a:p>
+            <a:pPr lvl="0" indent="0">
+              <a:buNone/>
+            </a:pPr>
+            <a:r>
+              <a:rPr sz="2000">
+                <a:latin typeface="Courier"/>
+              </a:rPr>
+              <a:t>Mean: 257.4 mm</a:t>
+            </a:r>
+          </a:p>
+          <a:p>
+            <a:pPr lvl="0" indent="0">
+              <a:buNone/>
+            </a:pPr>
+            <a:r>
+              <a:rPr sz="2000">
+                <a:latin typeface="Courier"/>
+              </a:rPr>
+              <a:t>Standard deviation: 26.44 mm</a:t>
+            </a:r>
+          </a:p>
+          <a:p>
+            <a:pPr lvl="0" indent="0">
+              <a:buNone/>
+            </a:pPr>
+            <a:r>
+              <a:rPr sz="2000">
+                <a:latin typeface="Courier"/>
+              </a:rPr>
+              <a:t>Standard error: 8.36 mm</a:t>
+            </a:r>
+          </a:p>
+          <a:p>
+            <a:pPr lvl="0" indent="0">
+              <a:buNone/>
+            </a:pPr>
+            <a:r>
+              <a:rPr sz="2000">
+                <a:latin typeface="Courier"/>
+              </a:rPr>
+              <a:t>95% CI using z: 241 to 273.8 mm</a:t>
+            </a:r>
+          </a:p>
+          <a:p>
+            <a:pPr lvl="0" indent="0">
+              <a:buNone/>
+            </a:pPr>
+            <a:r>
+              <a:rPr sz="2000">
+                <a:latin typeface="Courier"/>
+              </a:rPr>
+              <a:t>95% CI using t: 238.5 to 276.3 mm</a:t>
+            </a:r>
+          </a:p>
+          <a:p>
+            <a:pPr lvl="0" indent="0">
+              <a:buNone/>
+            </a:pPr>
+            <a:r>
+              <a:rPr sz="2000">
+                <a:latin typeface="Courier"/>
+              </a:rPr>
+              <a:t>t critical value: 2.262 vs z critical value: 1.96</a:t>
+            </a:r>
+          </a:p>
+        </p:txBody>
+      </p:sp>
     </p:spTree>
   </p:cSld>
 </p:sld>
 </file>
 
 <file path=ppt/slides/slide11.xml><?xml version="1.0" encoding="utf-8"?>
-<p:sld xmlns:a="http://schemas.openxmlformats.org/drawingml/2006/main" xmlns:r="http://schemas.openxmlformats.org/officeDocument/2006/relationships" xmlns:p="http://schemas.openxmlformats.org/presentationml/2006/main">
-  <p:cSld>
-    <p:spTree>
-      <p:nvGrpSpPr>
-        <p:cNvPr id="1" name=""/>
-        <p:cNvGrpSpPr/>
-        <p:nvPr/>
-      </p:nvGrpSpPr>
-      <p:grpSpPr>
-        <a:xfrm>
-          <a:off x="0" y="0"/>
-          <a:ext cx="0" cy="0"/>
-          <a:chOff x="0" y="0"/>
-          <a:chExt cx="0" cy="0"/>
-        </a:xfrm>
-      </p:grpSpPr>
-      <p:sp>
-        <p:nvSpPr>
-          <p:cNvPr id="2" name="Title 1"/>
-          <p:cNvSpPr>
-            <a:spLocks noGrp="1"/>
-          </p:cNvSpPr>
-          <p:nvPr>
-            <p:ph type="title"/>
-          </p:nvPr>
-        </p:nvSpPr>
-        <p:spPr>
-          <a:xfrm>
-            <a:off x="0" y="0"/>
-            <a:ext cx="9144000" cy="602780"/>
-          </a:xfrm>
-          <a:solidFill>
-            <a:srgbClr val="70121D"/>
-          </a:solidFill>
-        </p:spPr>
-        <p:txBody>
-          <a:bodyPr/>
-          <a:lstStyle/>
-          <a:p>
-            <a:pPr lvl="0" indent="0" marL="0">
-              <a:buNone/>
-            </a:pPr>
-            <a:r>
-              <a:rPr b="1"/>
-              <a:t>Lecture 5:</a:t>
-            </a:r>
-            <a:r>
-              <a:rPr/>
-              <a:t> Understanding t-distribution</a:t>
-            </a:r>
-          </a:p>
-        </p:txBody>
-      </p:sp>
-      <p:sp>
-        <p:nvSpPr>
-          <p:cNvPr id="3" name="Content Placeholder 2"/>
-          <p:cNvSpPr>
-            <a:spLocks noGrp="1"/>
-          </p:cNvSpPr>
-          <p:nvPr>
-            <p:ph idx="1" sz="half"/>
-          </p:nvPr>
-        </p:nvSpPr>
-        <p:spPr/>
-        <p:txBody>
-          <a:bodyPr/>
-          <a:lstStyle/>
-          <a:p>
-            <a:pPr lvl="0" indent="0" marL="0">
-              <a:buNone/>
-            </a:pPr>
-            <a:r>
-              <a:rPr/>
-              <a:t>When sample sizes are small, the </a:t>
-            </a:r>
-            <a:r>
-              <a:rPr b="1"/>
-              <a:t>t-distribution</a:t>
-            </a:r>
-            <a:r>
-              <a:rPr/>
-              <a:t> is more appropriate than the normal distribution.</a:t>
-            </a:r>
-          </a:p>
-          <a:p>
-            <a:pPr lvl="0"/>
-            <a:r>
-              <a:rPr/>
-              <a:t>Similar to normal distribution (1.96 = 2.5% tails) but with heavier tails</a:t>
-            </a:r>
-          </a:p>
-          <a:p>
-            <a:pPr lvl="0"/>
-            <a:r>
-              <a:rPr/>
-              <a:t>Shape depends on </a:t>
-            </a:r>
-            <a:r>
-              <a:rPr b="1"/>
-              <a:t>degrees of freedom</a:t>
-            </a:r>
-            <a:r>
-              <a:rPr/>
-              <a:t> (df = n-1)</a:t>
-            </a:r>
-          </a:p>
-          <a:p>
-            <a:pPr lvl="0"/>
-            <a:r>
-              <a:rPr/>
-              <a:t>With large df (&gt;30), approaches the normal distribution</a:t>
-            </a:r>
-          </a:p>
-          <a:p>
-            <a:pPr lvl="0"/>
-            <a:r>
-              <a:rPr/>
-              <a:t>Used for:</a:t>
-            </a:r>
-          </a:p>
-          <a:p>
-            <a:pPr lvl="1"/>
-            <a:r>
-              <a:rPr/>
-              <a:t>Small sample sizes</a:t>
-            </a:r>
-          </a:p>
-          <a:p>
-            <a:pPr lvl="1"/>
-            <a:r>
-              <a:rPr/>
-              <a:t>When population standard deviation is unknown</a:t>
-            </a:r>
-          </a:p>
-          <a:p>
-            <a:pPr lvl="1"/>
-            <a:r>
-              <a:rPr/>
-              <a:t>Calculating confidence intervals</a:t>
-            </a:r>
-          </a:p>
-          <a:p>
-            <a:pPr lvl="1"/>
-            <a:r>
-              <a:rPr/>
-              <a:t>Conducting t-tests</a:t>
-            </a:r>
-          </a:p>
-        </p:txBody>
-      </p:sp>
-      <p:pic>
-        <p:nvPicPr>
-          <p:cNvPr descr="images/clipboard-3203878802.png" id="0" name="Picture 1"/>
-          <p:cNvPicPr>
-            <a:picLocks noGrp="1" noChangeAspect="1"/>
-          </p:cNvPicPr>
-          <p:nvPr/>
-        </p:nvPicPr>
-        <p:blipFill>
-          <a:blip r:embed="rId2"/>
-          <a:stretch>
-            <a:fillRect/>
-          </a:stretch>
-        </p:blipFill>
-        <p:spPr bwMode="auto">
-          <a:xfrm>
-            <a:off x="6121400" y="1562100"/>
-            <a:ext cx="2781300" cy="2667000"/>
-          </a:xfrm>
-          <a:prstGeom prst="rect">
-            <a:avLst/>
-          </a:prstGeom>
-          <a:noFill/>
-          <a:ln w="9525">
-            <a:noFill/>
-            <a:headEnd/>
-            <a:tailEnd/>
-          </a:ln>
-        </p:spPr>
-      </p:pic>
-    </p:spTree>
-  </p:cSld>
-</p:sld>
-</file>
-
-<file path=ppt/slides/slide12.xml><?xml version="1.0" encoding="utf-8"?>
-<p:sld xmlns:a="http://schemas.openxmlformats.org/drawingml/2006/main" xmlns:r="http://schemas.openxmlformats.org/officeDocument/2006/relationships" xmlns:p="http://schemas.openxmlformats.org/presentationml/2006/main">
-  <p:cSld>
-    <p:spTree>
-      <p:nvGrpSpPr>
-        <p:cNvPr id="1" name=""/>
-        <p:cNvGrpSpPr/>
-        <p:nvPr/>
-      </p:nvGrpSpPr>
-      <p:grpSpPr>
-        <a:xfrm>
-          <a:off x="0" y="0"/>
-          <a:ext cx="0" cy="0"/>
-          <a:chOff x="0" y="0"/>
-          <a:chExt cx="0" cy="0"/>
-        </a:xfrm>
-      </p:grpSpPr>
-      <p:sp>
-        <p:nvSpPr>
-          <p:cNvPr id="3" name="Content Placeholder 2"/>
-          <p:cNvSpPr>
-            <a:spLocks noGrp="1"/>
-          </p:cNvSpPr>
-          <p:nvPr>
-            <p:ph idx="1"/>
-          </p:nvPr>
-        </p:nvSpPr>
-        <p:spPr/>
-        <p:txBody>
-          <a:bodyPr/>
-          <a:lstStyle/>
-          <a:p>
-            <a:pPr lvl="0" indent="0" marL="1270000">
-              <a:buNone/>
-            </a:pPr>
-            <a:r>
-              <a:rPr sz="2000" b="1"/>
-              <a:t>Practice Exercise 4: Using the t-distribution</a:t>
-            </a:r>
-          </a:p>
-          <a:p>
-            <a:pPr lvl="0" indent="0" marL="1270000">
-              <a:buNone/>
-            </a:pPr>
-            <a:r>
-              <a:rPr sz="2000"/>
-              <a:t>Let’s compare confidence intervals using the normal approximation (z) versus the t-distribution for our fish data.</a:t>
-            </a:r>
-          </a:p>
-          <a:p>
-            <a:pPr lvl="0" indent="0">
-              <a:buNone/>
-            </a:pPr>
-            <a:r>
-              <a:rPr sz="2000">
-                <a:latin typeface="Courier"/>
-              </a:rPr>
-              <a:t>Mean: 270.1 mm</a:t>
-            </a:r>
-          </a:p>
-          <a:p>
-            <a:pPr lvl="0" indent="0">
-              <a:buNone/>
-            </a:pPr>
-            <a:r>
-              <a:rPr sz="2000">
-                <a:latin typeface="Courier"/>
-              </a:rPr>
-              <a:t>Standard deviation: 33.99 mm</a:t>
-            </a:r>
-          </a:p>
-          <a:p>
-            <a:pPr lvl="0" indent="0">
-              <a:buNone/>
-            </a:pPr>
-            <a:r>
-              <a:rPr sz="2000">
-                <a:latin typeface="Courier"/>
-              </a:rPr>
-              <a:t>Standard error: 10.75 mm</a:t>
-            </a:r>
-          </a:p>
-          <a:p>
-            <a:pPr lvl="0" indent="0">
-              <a:buNone/>
-            </a:pPr>
-            <a:r>
-              <a:rPr sz="2000">
-                <a:latin typeface="Courier"/>
-              </a:rPr>
-              <a:t>95% CI using z: 249 to 291.2 mm</a:t>
-            </a:r>
-          </a:p>
-          <a:p>
-            <a:pPr lvl="0" indent="0">
-              <a:buNone/>
-            </a:pPr>
-            <a:r>
-              <a:rPr sz="2000">
-                <a:latin typeface="Courier"/>
-              </a:rPr>
-              <a:t>95% CI using t: 245.8 to 294.4 mm</a:t>
-            </a:r>
-          </a:p>
-          <a:p>
-            <a:pPr lvl="0" indent="0">
-              <a:buNone/>
-            </a:pPr>
-            <a:r>
-              <a:rPr sz="2000">
-                <a:latin typeface="Courier"/>
-              </a:rPr>
-              <a:t>t critical value: 2.262 vs z critical value: 1.96</a:t>
-            </a:r>
-          </a:p>
-        </p:txBody>
-      </p:sp>
-    </p:spTree>
-  </p:cSld>
-</p:sld>
-</file>
-
-<file path=ppt/slides/slide13.xml><?xml version="1.0" encoding="utf-8"?>
 <p:sld xmlns:a="http://schemas.openxmlformats.org/drawingml/2006/main" xmlns:r="http://schemas.openxmlformats.org/officeDocument/2006/relationships" xmlns:p="http://schemas.openxmlformats.org/presentationml/2006/main">
   <p:cSld>
     <p:spTree>
@@ -4099,7 +3723,7 @@
 </p:sld>
 </file>
 
-<file path=ppt/slides/slide14.xml><?xml version="1.0" encoding="utf-8"?>
+<file path=ppt/slides/slide12.xml><?xml version="1.0" encoding="utf-8"?>
 <p:sld xmlns:a="http://schemas.openxmlformats.org/drawingml/2006/main" xmlns:r="http://schemas.openxmlformats.org/officeDocument/2006/relationships" xmlns:p="http://schemas.openxmlformats.org/presentationml/2006/main">
   <p:cSld>
     <p:spTree>
@@ -4241,7 +3865,7 @@
 </p:sld>
 </file>
 
-<file path=ppt/slides/slide15.xml><?xml version="1.0" encoding="utf-8"?>
+<file path=ppt/slides/slide13.xml><?xml version="1.0" encoding="utf-8"?>
 <p:sld xmlns:a="http://schemas.openxmlformats.org/drawingml/2006/main" xmlns:r="http://schemas.openxmlformats.org/officeDocument/2006/relationships" xmlns:p="http://schemas.openxmlformats.org/presentationml/2006/main">
   <p:cSld>
     <p:spTree>
@@ -4369,7 +3993,7 @@
 </p:sld>
 </file>
 
-<file path=ppt/slides/slide16.xml><?xml version="1.0" encoding="utf-8"?>
+<file path=ppt/slides/slide14.xml><?xml version="1.0" encoding="utf-8"?>
 <p:sld xmlns:a="http://schemas.openxmlformats.org/drawingml/2006/main" xmlns:r="http://schemas.openxmlformats.org/officeDocument/2006/relationships" xmlns:p="http://schemas.openxmlformats.org/presentationml/2006/main">
   <p:cSld>
     <p:spTree>
@@ -4497,7 +4121,7 @@
 </p:sld>
 </file>
 
-<file path=ppt/slides/slide17.xml><?xml version="1.0" encoding="utf-8"?>
+<file path=ppt/slides/slide15.xml><?xml version="1.0" encoding="utf-8"?>
 <p:sld xmlns:a="http://schemas.openxmlformats.org/drawingml/2006/main" xmlns:r="http://schemas.openxmlformats.org/officeDocument/2006/relationships" xmlns:p="http://schemas.openxmlformats.org/presentationml/2006/main">
   <p:cSld>
     <p:spTree>
@@ -4713,7 +4337,7 @@
 </p:sld>
 </file>
 
-<file path=ppt/slides/slide18.xml><?xml version="1.0" encoding="utf-8"?>
+<file path=ppt/slides/slide16.xml><?xml version="1.0" encoding="utf-8"?>
 <p:sld xmlns:a="http://schemas.openxmlformats.org/drawingml/2006/main" xmlns:r="http://schemas.openxmlformats.org/officeDocument/2006/relationships" xmlns:p="http://schemas.openxmlformats.org/presentationml/2006/main">
   <p:cSld>
     <p:spTree>
@@ -4822,7 +4446,7 @@
 </p:sld>
 </file>
 
-<file path=ppt/slides/slide19.xml><?xml version="1.0" encoding="utf-8"?>
+<file path=ppt/slides/slide17.xml><?xml version="1.0" encoding="utf-8"?>
 <p:sld xmlns:a="http://schemas.openxmlformats.org/drawingml/2006/main" xmlns:r="http://schemas.openxmlformats.org/officeDocument/2006/relationships" xmlns:p="http://schemas.openxmlformats.org/presentationml/2006/main">
   <p:cSld>
     <p:spTree>
@@ -4852,11 +4476,8 @@
         <p:spPr>
           <a:xfrm>
             <a:off x="0" y="0"/>
-            <a:ext cx="9144000" cy="602780"/>
+            <a:ext cx="9144000" cy="582780"/>
           </a:xfrm>
-          <a:solidFill>
-            <a:srgbClr val="70121D"/>
-          </a:solidFill>
         </p:spPr>
         <p:txBody>
           <a:bodyPr/>
@@ -4883,7 +4504,7 @@
             <a:spLocks noGrp="1"/>
           </p:cNvSpPr>
           <p:nvPr>
-            <p:ph idx="1" sz="half"/>
+            <p:ph idx="1"/>
           </p:nvPr>
         </p:nvSpPr>
         <p:spPr/>
@@ -4926,22 +4547,6 @@
               <a:t>H₁: μ ≠ 240 (The mean fish length in I3 is not 55mm)</a:t>
             </a:r>
           </a:p>
-        </p:txBody>
-      </p:sp>
-      <p:sp>
-        <p:nvSpPr>
-          <p:cNvPr id="4" name="Content Placeholder 3"/>
-          <p:cNvSpPr>
-            <a:spLocks noGrp="1"/>
-          </p:cNvSpPr>
-          <p:nvPr>
-            <p:ph idx="2" sz="half"/>
-          </p:nvPr>
-        </p:nvSpPr>
-        <p:spPr/>
-        <p:txBody>
-          <a:bodyPr/>
-          <a:lstStyle/>
           <a:p>
             <a:pPr lvl="0" indent="0" marL="0">
               <a:spcBef>
@@ -4988,135 +4593,7 @@
 </p:sld>
 </file>
 
-<file path=ppt/slides/slide2.xml><?xml version="1.0" encoding="utf-8"?>
-<p:sld xmlns:a="http://schemas.openxmlformats.org/drawingml/2006/main" xmlns:r="http://schemas.openxmlformats.org/officeDocument/2006/relationships" xmlns:p="http://schemas.openxmlformats.org/presentationml/2006/main">
-  <p:cSld>
-    <p:spTree>
-      <p:nvGrpSpPr>
-        <p:cNvPr id="1" name=""/>
-        <p:cNvGrpSpPr/>
-        <p:nvPr/>
-      </p:nvGrpSpPr>
-      <p:grpSpPr>
-        <a:xfrm>
-          <a:off x="0" y="0"/>
-          <a:ext cx="0" cy="0"/>
-          <a:chOff x="0" y="0"/>
-          <a:chExt cx="0" cy="0"/>
-        </a:xfrm>
-      </p:grpSpPr>
-      <p:sp>
-        <p:nvSpPr>
-          <p:cNvPr id="2" name="Title 1"/>
-          <p:cNvSpPr>
-            <a:spLocks noGrp="1"/>
-          </p:cNvSpPr>
-          <p:nvPr>
-            <p:ph type="title"/>
-          </p:nvPr>
-        </p:nvSpPr>
-        <p:spPr>
-          <a:xfrm>
-            <a:off x="0" y="0"/>
-            <a:ext cx="9144000" cy="602780"/>
-          </a:xfrm>
-          <a:solidFill>
-            <a:srgbClr val="70121D"/>
-          </a:solidFill>
-        </p:spPr>
-        <p:txBody>
-          <a:bodyPr/>
-          <a:lstStyle/>
-          <a:p>
-            <a:pPr lvl="0" indent="0" marL="0">
-              <a:buNone/>
-            </a:pPr>
-            <a:r>
-              <a:rPr b="1"/>
-              <a:t>Lecture 4: Review</a:t>
-            </a:r>
-          </a:p>
-        </p:txBody>
-      </p:sp>
-      <p:sp>
-        <p:nvSpPr>
-          <p:cNvPr id="3" name="Content Placeholder 2"/>
-          <p:cNvSpPr>
-            <a:spLocks noGrp="1"/>
-          </p:cNvSpPr>
-          <p:nvPr>
-            <p:ph idx="1" sz="half"/>
-          </p:nvPr>
-        </p:nvSpPr>
-        <p:spPr/>
-        <p:txBody>
-          <a:bodyPr/>
-          <a:lstStyle/>
-          <a:p>
-            <a:pPr lvl="0"/>
-            <a:r>
-              <a:rPr/>
-              <a:t>Introduction to histograms or frequency distributions</a:t>
-            </a:r>
-          </a:p>
-          <a:p>
-            <a:pPr lvl="0"/>
-            <a:r>
-              <a:rPr/>
-              <a:t>Probability Distribution Functions (PDF)</a:t>
-            </a:r>
-          </a:p>
-          <a:p>
-            <a:pPr lvl="0"/>
-            <a:r>
-              <a:rPr/>
-              <a:t>Descriptive Statistics</a:t>
-            </a:r>
-          </a:p>
-          <a:p>
-            <a:pPr lvl="1"/>
-            <a:r>
-              <a:rPr/>
-              <a:t>Center - mean, median, mode</a:t>
-            </a:r>
-          </a:p>
-          <a:p>
-            <a:pPr lvl="1"/>
-            <a:r>
-              <a:rPr/>
-              <a:t>Spread - range, variance, standard deviation</a:t>
-            </a:r>
-          </a:p>
-        </p:txBody>
-      </p:sp>
-      <p:sp>
-        <p:nvSpPr>
-          <p:cNvPr id="4" name="Content Placeholder 3"/>
-          <p:cNvSpPr>
-            <a:spLocks noGrp="1"/>
-          </p:cNvSpPr>
-          <p:nvPr>
-            <p:ph idx="2" sz="half"/>
-          </p:nvPr>
-        </p:nvSpPr>
-        <p:spPr/>
-        <p:txBody>
-          <a:bodyPr/>
-          <a:lstStyle/>
-          <a:p>
-            <a:pPr lvl="0" indent="0" marL="0">
-              <a:buNone/>
-            </a:pPr>
-            <a:br/>
-          </a:p>
-        </p:txBody>
-      </p:sp>
-    </p:spTree>
-  </p:cSld>
-</p:sld>
-</file>
-
-<file path=ppt/slides/slide20.xml><?xml version="1.0" encoding="utf-8"?>
+<file path=ppt/slides/slide18.xml><?xml version="1.0" encoding="utf-8"?>
 <p:sld xmlns:a="http://schemas.openxmlformats.org/drawingml/2006/main" xmlns:r="http://schemas.openxmlformats.org/officeDocument/2006/relationships" xmlns:p="http://schemas.openxmlformats.org/presentationml/2006/main">
   <p:cSld>
     <p:spTree>
@@ -5198,7 +4675,7 @@
 </p:sld>
 </file>
 
-<file path=ppt/slides/slide21.xml><?xml version="1.0" encoding="utf-8"?>
+<file path=ppt/slides/slide19.xml><?xml version="1.0" encoding="utf-8"?>
 <p:sld xmlns:a="http://schemas.openxmlformats.org/drawingml/2006/main" xmlns:r="http://schemas.openxmlformats.org/officeDocument/2006/relationships" xmlns:p="http://schemas.openxmlformats.org/presentationml/2006/main">
   <p:cSld>
     <p:spTree>
@@ -5303,7 +4780,7 @@
 </p:sld>
 </file>
 
-<file path=ppt/slides/slide22.xml><?xml version="1.0" encoding="utf-8"?>
+<file path=ppt/slides/slide2.xml><?xml version="1.0" encoding="utf-8"?>
 <p:sld xmlns:a="http://schemas.openxmlformats.org/drawingml/2006/main" xmlns:r="http://schemas.openxmlformats.org/officeDocument/2006/relationships" xmlns:p="http://schemas.openxmlformats.org/presentationml/2006/main">
   <p:cSld>
     <p:spTree>
@@ -5333,8 +4810,11 @@
         <p:spPr>
           <a:xfrm>
             <a:off x="0" y="0"/>
-            <a:ext cx="9144000" cy="582780"/>
+            <a:ext cx="9144000" cy="602780"/>
           </a:xfrm>
+          <a:solidFill>
+            <a:srgbClr val="70121D"/>
+          </a:solidFill>
         </p:spPr>
         <p:txBody>
           <a:bodyPr/>
@@ -5344,8 +4824,8 @@
               <a:buNone/>
             </a:pPr>
             <a:r>
-              <a:rPr/>
-              <a:t>Now for Practice</a:t>
+              <a:rPr b="1"/>
+              <a:t>Lecture 4: Review</a:t>
             </a:r>
           </a:p>
         </p:txBody>
@@ -5357,7 +4837,7 @@
             <a:spLocks noGrp="1"/>
           </p:cNvSpPr>
           <p:nvPr>
-            <p:ph idx="1"/>
+            <p:ph idx="1" sz="half"/>
           </p:nvPr>
         </p:nvSpPr>
         <p:spPr/>
@@ -5365,107 +4845,61 @@
           <a:bodyPr/>
           <a:lstStyle/>
           <a:p>
-            <a:pPr lvl="0" indent="0" marL="1270000">
-              <a:buNone/>
-            </a:pPr>
-            <a:r>
-              <a:rPr sz="2000" b="1"/>
-              <a:t>Practice Exercise 1: One-Sample t-Test</a:t>
-            </a:r>
-          </a:p>
-          <a:p>
-            <a:pPr lvl="0" indent="0" marL="1270000">
-              <a:buNone/>
-            </a:pPr>
-            <a:r>
-              <a:rPr sz="2000"/>
-              <a:t>Let’s perform a one-sample t-test to determine if the mean fish length in I3 Lake differs from 240 mm:</a:t>
-            </a:r>
-          </a:p>
-          <a:p>
-            <a:pPr lvl="0" indent="0">
-              <a:buNone/>
-            </a:pPr>
-            <a:r>
-              <a:rPr sz="2000">
-                <a:latin typeface="Courier"/>
-              </a:rPr>
-              <a:t>Mean: 265.6 mm</a:t>
-            </a:r>
-          </a:p>
-          <a:p>
-            <a:pPr lvl="0" indent="0">
-              <a:buNone/>
-            </a:pPr>
-            <a:r>
-              <a:rPr sz="2000">
-                <a:latin typeface="Courier"/>
-              </a:rPr>
-              <a:t>
-    One Sample t-test
-data:  i3_df$length_mm
-t = 7.3497, df = 65, p-value = 4.17e-10
-alternative hypothesis: true mean is not equal to 240
-95 percent confidence interval:
- 258.6481 272.5640
-sample estimates:
-mean of x 
- 265.6061 </a:t>
-            </a:r>
-          </a:p>
-          <a:p>
-            <a:pPr lvl="0" indent="0" marL="1270000">
-              <a:buNone/>
-            </a:pPr>
-            <a:r>
-              <a:rPr sz="2000"/>
-              <a:t>Interpret this test result by answering these questions:</a:t>
-            </a:r>
-          </a:p>
-          <a:p>
-            <a:pPr lvl="0" indent="-342900" marL="342900">
-              <a:buAutoNum type="arabicPeriod"/>
-            </a:pPr>
-            <a:r>
-              <a:rPr sz="2000"/>
-              <a:t>What was the null hypothesis?</a:t>
-            </a:r>
-          </a:p>
-          <a:p>
-            <a:pPr lvl="0" indent="-342900" marL="342900">
-              <a:buAutoNum type="arabicPeriod"/>
-            </a:pPr>
-            <a:r>
-              <a:rPr sz="2000"/>
-              <a:t>What was the alternative hypothesis?</a:t>
-            </a:r>
-          </a:p>
-          <a:p>
-            <a:pPr lvl="0" indent="-342900" marL="342900">
-              <a:buAutoNum type="arabicPeriod"/>
-            </a:pPr>
-            <a:r>
-              <a:rPr sz="2000"/>
-              <a:t>What does the p-value tell us?</a:t>
-            </a:r>
-          </a:p>
-          <a:p>
-            <a:pPr lvl="0" indent="-342900" marL="342900">
-              <a:buAutoNum type="arabicPeriod"/>
-            </a:pPr>
-            <a:r>
-              <a:rPr sz="2000"/>
-              <a:t>Should we reject or fail to reject the null hypothesis at α = 0.05?</a:t>
-            </a:r>
-          </a:p>
-          <a:p>
-            <a:pPr lvl="0" indent="-342900" marL="342900">
-              <a:buAutoNum type="arabicPeriod"/>
-            </a:pPr>
-            <a:r>
-              <a:rPr sz="2000"/>
-              <a:t>What is the practical interpretation of this result for fish biologists?</a:t>
-            </a:r>
+            <a:pPr lvl="0"/>
+            <a:r>
+              <a:rPr/>
+              <a:t>Introduction to histograms or frequency distributions</a:t>
+            </a:r>
+          </a:p>
+          <a:p>
+            <a:pPr lvl="0"/>
+            <a:r>
+              <a:rPr/>
+              <a:t>Probability Distribution Functions (PDF)</a:t>
+            </a:r>
+          </a:p>
+          <a:p>
+            <a:pPr lvl="0"/>
+            <a:r>
+              <a:rPr/>
+              <a:t>Descriptive Statistics</a:t>
+            </a:r>
+          </a:p>
+          <a:p>
+            <a:pPr lvl="1"/>
+            <a:r>
+              <a:rPr/>
+              <a:t>Center - mean, median, mode</a:t>
+            </a:r>
+          </a:p>
+          <a:p>
+            <a:pPr lvl="1"/>
+            <a:r>
+              <a:rPr/>
+              <a:t>Spread - range, variance, standard deviation</a:t>
+            </a:r>
+          </a:p>
+        </p:txBody>
+      </p:sp>
+      <p:sp>
+        <p:nvSpPr>
+          <p:cNvPr id="4" name="Content Placeholder 3"/>
+          <p:cNvSpPr>
+            <a:spLocks noGrp="1"/>
+          </p:cNvSpPr>
+          <p:nvPr>
+            <p:ph idx="2" sz="half"/>
+          </p:nvPr>
+        </p:nvSpPr>
+        <p:spPr/>
+        <p:txBody>
+          <a:bodyPr/>
+          <a:lstStyle/>
+          <a:p>
+            <a:pPr lvl="0" indent="0" marL="0">
+              <a:buNone/>
+            </a:pPr>
+            <a:br/>
           </a:p>
         </p:txBody>
       </p:sp>
@@ -5474,7 +4908,7 @@
 </p:sld>
 </file>
 
-<file path=ppt/slides/slide23.xml><?xml version="1.0" encoding="utf-8"?>
+<file path=ppt/slides/slide20.xml><?xml version="1.0" encoding="utf-8"?>
 <p:sld xmlns:a="http://schemas.openxmlformats.org/drawingml/2006/main" xmlns:r="http://schemas.openxmlformats.org/officeDocument/2006/relationships" xmlns:p="http://schemas.openxmlformats.org/presentationml/2006/main">
   <p:cSld>
     <p:spTree>
@@ -5491,12 +4925,161 @@
           <a:chExt cx="0" cy="0"/>
         </a:xfrm>
       </p:grpSpPr>
+      <p:sp>
+        <p:nvSpPr>
+          <p:cNvPr id="2" name="Title 1"/>
+          <p:cNvSpPr>
+            <a:spLocks noGrp="1"/>
+          </p:cNvSpPr>
+          <p:nvPr>
+            <p:ph type="title"/>
+          </p:nvPr>
+        </p:nvSpPr>
+        <p:spPr>
+          <a:xfrm>
+            <a:off x="0" y="0"/>
+            <a:ext cx="9144000" cy="582780"/>
+          </a:xfrm>
+        </p:spPr>
+        <p:txBody>
+          <a:bodyPr/>
+          <a:lstStyle/>
+          <a:p>
+            <a:pPr lvl="0" indent="0" marL="0">
+              <a:buNone/>
+            </a:pPr>
+            <a:r>
+              <a:rPr/>
+              <a:t>Now for Practice</a:t>
+            </a:r>
+          </a:p>
+        </p:txBody>
+      </p:sp>
+      <p:sp>
+        <p:nvSpPr>
+          <p:cNvPr id="3" name="Content Placeholder 2"/>
+          <p:cNvSpPr>
+            <a:spLocks noGrp="1"/>
+          </p:cNvSpPr>
+          <p:nvPr>
+            <p:ph idx="1"/>
+          </p:nvPr>
+        </p:nvSpPr>
+        <p:spPr/>
+        <p:txBody>
+          <a:bodyPr/>
+          <a:lstStyle/>
+          <a:p>
+            <a:pPr lvl="0" indent="0" marL="1270000">
+              <a:buNone/>
+            </a:pPr>
+            <a:r>
+              <a:rPr sz="2000" b="1"/>
+              <a:t>Practice Exercise 1: One-Sample t-Test</a:t>
+            </a:r>
+          </a:p>
+          <a:p>
+            <a:pPr lvl="0" indent="0" marL="1270000">
+              <a:buNone/>
+            </a:pPr>
+            <a:r>
+              <a:rPr sz="2000"/>
+              <a:t>Let’s perform a one-sample t-test to determine if the mean fish length in I3 Lake differs from 240 mm:</a:t>
+            </a:r>
+          </a:p>
+          <a:p>
+            <a:pPr lvl="0" indent="0">
+              <a:buNone/>
+            </a:pPr>
+            <a:r>
+              <a:rPr sz="2000">
+                <a:latin typeface="Courier"/>
+              </a:rPr>
+              <a:t>Mean: 265.6 mm</a:t>
+            </a:r>
+          </a:p>
+          <a:p>
+            <a:pPr lvl="0" indent="0">
+              <a:buNone/>
+            </a:pPr>
+            <a:r>
+              <a:rPr sz="2000">
+                <a:latin typeface="Courier"/>
+              </a:rPr>
+              <a:t>
+    One Sample t-test
+data:  i3_df$length_mm
+t = 7.3497, df = 65, p-value = 4.17e-10
+alternative hypothesis: true mean is not equal to 240
+95 percent confidence interval:
+ 258.6481 272.5640
+sample estimates:
+mean of x 
+ 265.6061 </a:t>
+            </a:r>
+          </a:p>
+          <a:p>
+            <a:pPr lvl="0" indent="0" marL="1270000">
+              <a:buNone/>
+            </a:pPr>
+            <a:r>
+              <a:rPr sz="2000"/>
+              <a:t>Interpret this test result by answering these questions:</a:t>
+            </a:r>
+          </a:p>
+          <a:p>
+            <a:pPr lvl="0" indent="-342900" marL="342900">
+              <a:buAutoNum type="arabicPeriod"/>
+            </a:pPr>
+            <a:r>
+              <a:rPr sz="2000"/>
+              <a:t>What was the null hypothesis?</a:t>
+            </a:r>
+          </a:p>
+          <a:p>
+            <a:pPr lvl="0" indent="-342900" marL="342900">
+              <a:buAutoNum type="arabicPeriod"/>
+            </a:pPr>
+            <a:r>
+              <a:rPr sz="2000"/>
+              <a:t>What was the alternative hypothesis?</a:t>
+            </a:r>
+          </a:p>
+          <a:p>
+            <a:pPr lvl="0" indent="-342900" marL="342900">
+              <a:buAutoNum type="arabicPeriod"/>
+            </a:pPr>
+            <a:r>
+              <a:rPr sz="2000"/>
+              <a:t>What does the p-value tell us?</a:t>
+            </a:r>
+          </a:p>
+          <a:p>
+            <a:pPr lvl="0" indent="-342900" marL="342900">
+              <a:buAutoNum type="arabicPeriod"/>
+            </a:pPr>
+            <a:r>
+              <a:rPr sz="2000"/>
+              <a:t>Should we reject or fail to reject the null hypothesis at α = 0.05?</a:t>
+            </a:r>
+          </a:p>
+          <a:p>
+            <a:pPr lvl="0" indent="-342900" marL="342900">
+              <a:buAutoNum type="arabicPeriod"/>
+            </a:pPr>
+            <a:r>
+              <a:rPr sz="2000"/>
+              <a:t>What is the practical interpretation of this result for fish biologists?</a:t>
+            </a:r>
+          </a:p>
+        </p:txBody>
+      </p:sp>
     </p:spTree>
   </p:cSld>
 </p:sld>
 </file>
 
-<file path=ppt/slides/slide24.xml><?xml version="1.0" encoding="utf-8"?>
+<file path=ppt/slides/slide21.xml><?xml version="1.0" encoding="utf-8"?>
 <p:sld xmlns:a="http://schemas.openxmlformats.org/drawingml/2006/main" xmlns:r="http://schemas.openxmlformats.org/officeDocument/2006/relationships" xmlns:p="http://schemas.openxmlformats.org/presentationml/2006/main">
   <p:cSld>
     <p:spTree>
@@ -5697,7 +5280,7 @@
 </p:sld>
 </file>
 
-<file path=ppt/slides/slide25.xml><?xml version="1.0" encoding="utf-8"?>
+<file path=ppt/slides/slide22.xml><?xml version="1.0" encoding="utf-8"?>
 <p:sld xmlns:a="http://schemas.openxmlformats.org/drawingml/2006/main" xmlns:r="http://schemas.openxmlformats.org/officeDocument/2006/relationships" xmlns:p="http://schemas.openxmlformats.org/presentationml/2006/main">
   <p:cSld>
     <p:spTree>
@@ -5898,7 +5481,7 @@
 </p:sld>
 </file>
 
-<file path=ppt/slides/slide26.xml><?xml version="1.0" encoding="utf-8"?>
+<file path=ppt/slides/slide23.xml><?xml version="1.0" encoding="utf-8"?>
 <p:sld xmlns:a="http://schemas.openxmlformats.org/drawingml/2006/main" xmlns:r="http://schemas.openxmlformats.org/officeDocument/2006/relationships" xmlns:p="http://schemas.openxmlformats.org/presentationml/2006/main">
   <p:cSld>
     <p:spTree>
@@ -6007,7 +5590,7 @@
 </p:sld>
 </file>
 
-<file path=ppt/slides/slide27.xml><?xml version="1.0" encoding="utf-8"?>
+<file path=ppt/slides/slide24.xml><?xml version="1.0" encoding="utf-8"?>
 <p:sld xmlns:a="http://schemas.openxmlformats.org/drawingml/2006/main" xmlns:r="http://schemas.openxmlformats.org/officeDocument/2006/relationships" xmlns:p="http://schemas.openxmlformats.org/presentationml/2006/main">
   <p:cSld>
     <p:spTree>
@@ -6146,7 +5729,7 @@
 </p:sld>
 </file>
 
-<file path=ppt/slides/slide28.xml><?xml version="1.0" encoding="utf-8"?>
+<file path=ppt/slides/slide25.xml><?xml version="1.0" encoding="utf-8"?>
 <p:sld xmlns:a="http://schemas.openxmlformats.org/drawingml/2006/main" xmlns:r="http://schemas.openxmlformats.org/officeDocument/2006/relationships" xmlns:p="http://schemas.openxmlformats.org/presentationml/2006/main">
   <p:cSld>
     <p:spTree>
@@ -6276,7 +5859,7 @@
 </p:sld>
 </file>
 
-<file path=ppt/slides/slide29.xml><?xml version="1.0" encoding="utf-8"?>
+<file path=ppt/slides/slide26.xml><?xml version="1.0" encoding="utf-8"?>
 <p:sld xmlns:a="http://schemas.openxmlformats.org/drawingml/2006/main" xmlns:r="http://schemas.openxmlformats.org/officeDocument/2006/relationships" xmlns:p="http://schemas.openxmlformats.org/presentationml/2006/main">
   <p:cSld>
     <p:spTree>
@@ -6368,57 +5951,7 @@
 </p:sld>
 </file>
 
-<file path=ppt/slides/slide3.xml><?xml version="1.0" encoding="utf-8"?>
-<p:sld xmlns:a="http://schemas.openxmlformats.org/drawingml/2006/main" xmlns:r="http://schemas.openxmlformats.org/officeDocument/2006/relationships" xmlns:p="http://schemas.openxmlformats.org/presentationml/2006/main">
-  <p:cSld>
-    <p:spTree>
-      <p:nvGrpSpPr>
-        <p:cNvPr id="1" name=""/>
-        <p:cNvGrpSpPr/>
-        <p:nvPr/>
-      </p:nvGrpSpPr>
-      <p:grpSpPr>
-        <a:xfrm>
-          <a:off x="0" y="0"/>
-          <a:ext cx="0" cy="0"/>
-          <a:chOff x="0" y="0"/>
-          <a:chExt cx="0" cy="0"/>
-        </a:xfrm>
-      </p:grpSpPr>
-      <p:sp>
-        <p:nvSpPr>
-          <p:cNvPr id="3" name="Content Placeholder 2"/>
-          <p:cNvSpPr>
-            <a:spLocks noGrp="1"/>
-          </p:cNvSpPr>
-          <p:nvPr>
-            <p:ph idx="1"/>
-          </p:nvPr>
-        </p:nvSpPr>
-        <p:spPr/>
-        <p:txBody>
-          <a:bodyPr/>
-          <a:lstStyle/>
-          <a:p>
-            <a:pPr lvl="0" indent="0" marL="0">
-              <a:spcBef>
-                <a:spcPts val="3000"/>
-              </a:spcBef>
-              <a:buNone/>
-            </a:pPr>
-            <a:r>
-              <a:rPr b="1"/>
-              <a:t>Lecture 4: Review</a:t>
-            </a:r>
-          </a:p>
-        </p:txBody>
-      </p:sp>
-    </p:spTree>
-  </p:cSld>
-</p:sld>
-</file>
-
-<file path=ppt/slides/slide30.xml><?xml version="1.0" encoding="utf-8"?>
+<file path=ppt/slides/slide27.xml><?xml version="1.0" encoding="utf-8"?>
 <p:sld xmlns:a="http://schemas.openxmlformats.org/drawingml/2006/main" xmlns:r="http://schemas.openxmlformats.org/officeDocument/2006/relationships" xmlns:p="http://schemas.openxmlformats.org/presentationml/2006/main">
   <p:cSld>
     <p:spTree>
@@ -6862,6 +6395,788 @@
 </p:sld>
 </file>
 
+<file path=ppt/slides/slide28.xml><?xml version="1.0" encoding="utf-8"?>
+<p:sld xmlns:a="http://schemas.openxmlformats.org/drawingml/2006/main" xmlns:r="http://schemas.openxmlformats.org/officeDocument/2006/relationships" xmlns:p="http://schemas.openxmlformats.org/presentationml/2006/main">
+  <p:cSld>
+    <p:spTree>
+      <p:nvGrpSpPr>
+        <p:cNvPr id="1" name=""/>
+        <p:cNvGrpSpPr/>
+        <p:nvPr/>
+      </p:nvGrpSpPr>
+      <p:grpSpPr>
+        <a:xfrm>
+          <a:off x="0" y="0"/>
+          <a:ext cx="0" cy="0"/>
+          <a:chOff x="0" y="0"/>
+          <a:chExt cx="0" cy="0"/>
+        </a:xfrm>
+      </p:grpSpPr>
+      <p:sp>
+        <p:nvSpPr>
+          <p:cNvPr id="3" name="Content Placeholder 2"/>
+          <p:cNvSpPr>
+            <a:spLocks noGrp="1"/>
+          </p:cNvSpPr>
+          <p:nvPr>
+            <p:ph idx="1"/>
+          </p:nvPr>
+        </p:nvSpPr>
+        <p:spPr/>
+        <p:txBody>
+          <a:bodyPr/>
+          <a:lstStyle/>
+          <a:p>
+            <a:pPr lvl="0" indent="0" marL="1270000">
+              <a:buNone/>
+            </a:pPr>
+            <a:r>
+              <a:rPr sz="2000" b="1"/>
+              <a:t>Practice Exercise 4: Effect size</a:t>
+            </a:r>
+          </a:p>
+          <a:p>
+            <a:pPr lvl="0" indent="0" marL="1270000">
+              <a:buNone/>
+            </a:pPr>
+            <a:r>
+              <a:rPr sz="2000"/>
+              <a:t>We could also look at the difference in means… some cool code here</a:t>
+            </a:r>
+          </a:p>
+          <a:p>
+            <a:pPr lvl="0" indent="0">
+              <a:buNone/>
+            </a:pPr>
+            <a:r>
+              <a:rPr sz="2000">
+                <a:latin typeface="Courier"/>
+              </a:rPr>
+              <a:t># A tibble: 1 × 1
+  difference
+       &lt;dbl&gt;
+1       -5.5</a:t>
+            </a:r>
+          </a:p>
+          <a:p>
+            <a:pPr lvl="0" indent="0" marL="1270000">
+              <a:buNone/>
+            </a:pPr>
+            <a:r>
+              <a:rPr sz="2000" b="1"/>
+              <a:t>Practice Exercise 5: Using GGPLOT to get summary stats</a:t>
+            </a:r>
+          </a:p>
+          <a:p>
+            <a:pPr lvl="0" indent="0" marL="1270000">
+              <a:buNone/>
+            </a:pPr>
+            <a:r>
+              <a:rPr sz="2000"/>
+              <a:t>GGplot also has code to make the mean and standard error plots we are interested in along whit a lot of others</a:t>
+            </a:r>
+          </a:p>
+          <a:p>
+            <a:pPr lvl="0" indent="0" marL="1270000">
+              <a:buNone/>
+            </a:pPr>
+          </a:p>
+        </p:txBody>
+      </p:sp>
+    </p:spTree>
+  </p:cSld>
+</p:sld>
+</file>
+
+<file path=ppt/slides/slide29.xml><?xml version="1.0" encoding="utf-8"?>
+<p:sld xmlns:a="http://schemas.openxmlformats.org/drawingml/2006/main" xmlns:r="http://schemas.openxmlformats.org/officeDocument/2006/relationships" xmlns:p="http://schemas.openxmlformats.org/presentationml/2006/main">
+  <p:cSld>
+    <p:spTree>
+      <p:nvGrpSpPr>
+        <p:cNvPr id="1" name=""/>
+        <p:cNvGrpSpPr/>
+        <p:nvPr/>
+      </p:nvGrpSpPr>
+      <p:grpSpPr>
+        <a:xfrm>
+          <a:off x="0" y="0"/>
+          <a:ext cx="0" cy="0"/>
+          <a:chOff x="0" y="0"/>
+          <a:chExt cx="0" cy="0"/>
+        </a:xfrm>
+      </p:grpSpPr>
+      <p:sp>
+        <p:nvSpPr>
+          <p:cNvPr id="2" name="Title 1"/>
+          <p:cNvSpPr>
+            <a:spLocks noGrp="1"/>
+          </p:cNvSpPr>
+          <p:nvPr>
+            <p:ph type="title"/>
+          </p:nvPr>
+        </p:nvSpPr>
+        <p:spPr>
+          <a:xfrm>
+            <a:off x="0" y="0"/>
+            <a:ext cx="9144000" cy="582780"/>
+          </a:xfrm>
+        </p:spPr>
+        <p:txBody>
+          <a:bodyPr/>
+          <a:lstStyle/>
+          <a:p>
+            <a:pPr lvl="0" indent="0" marL="0">
+              <a:buNone/>
+            </a:pPr>
+            <a:r>
+              <a:rPr b="1"/>
+              <a:t>Lecture 5:</a:t>
+            </a:r>
+            <a:r>
+              <a:rPr/>
+              <a:t> Testing Assumptions for Two-Sample T-Test</a:t>
+            </a:r>
+          </a:p>
+        </p:txBody>
+      </p:sp>
+      <p:sp>
+        <p:nvSpPr>
+          <p:cNvPr id="3" name="Content Placeholder 2"/>
+          <p:cNvSpPr>
+            <a:spLocks noGrp="1"/>
+          </p:cNvSpPr>
+          <p:nvPr>
+            <p:ph idx="1"/>
+          </p:nvPr>
+        </p:nvSpPr>
+        <p:spPr/>
+        <p:txBody>
+          <a:bodyPr/>
+          <a:lstStyle/>
+          <a:p>
+            <a:pPr lvl="0" indent="0" marL="0">
+              <a:buNone/>
+            </a:pPr>
+            <a:r>
+              <a:rPr/>
+              <a:t>For a two-sample t-test, we need to check:</a:t>
+            </a:r>
+          </a:p>
+          <a:p>
+            <a:pPr lvl="0" indent="-342900" marL="342900">
+              <a:buAutoNum type="arabicPeriod"/>
+            </a:pPr>
+            <a:r>
+              <a:rPr/>
+              <a:t>Normality within each group</a:t>
+            </a:r>
+          </a:p>
+          <a:p>
+            <a:pPr lvl="0" indent="-342900" marL="342900">
+              <a:buAutoNum type="arabicPeriod"/>
+            </a:pPr>
+            <a:r>
+              <a:rPr/>
+              <a:t>Equal variances between groups (for standard t-test)</a:t>
+            </a:r>
+          </a:p>
+          <a:p>
+            <a:pPr lvl="0" indent="-342900" marL="342900">
+              <a:buAutoNum type="arabicPeriod"/>
+            </a:pPr>
+            <a:r>
+              <a:rPr/>
+              <a:t>Independent observations</a:t>
+            </a:r>
+          </a:p>
+          <a:p>
+            <a:pPr lvl="0" indent="0" marL="0">
+              <a:buNone/>
+            </a:pPr>
+            <a:r>
+              <a:rPr/>
+              <a:t>If assumptions are violated:</a:t>
+            </a:r>
+          </a:p>
+          <a:p>
+            <a:pPr lvl="0"/>
+            <a:r>
+              <a:rPr/>
+              <a:t>Welch’s t-test (unequal variances)</a:t>
+            </a:r>
+          </a:p>
+          <a:p>
+            <a:pPr lvl="0"/>
+            <a:r>
+              <a:rPr/>
+              <a:t>Non-parametric alternatives (Mann-Whitney U test)</a:t>
+            </a:r>
+          </a:p>
+          <a:p>
+            <a:pPr lvl="0" indent="0" marL="1270000">
+              <a:buNone/>
+            </a:pPr>
+            <a:r>
+              <a:rPr sz="2000" b="1"/>
+              <a:t>Practice Exercise 6: Test normality of windward pine needle lengths</a:t>
+            </a:r>
+          </a:p>
+          <a:p>
+            <a:pPr lvl="0" indent="0" marL="1270000">
+              <a:buNone/>
+            </a:pPr>
+            <a:r>
+              <a:rPr sz="2000"/>
+              <a:t>qqplots</a:t>
+            </a:r>
+          </a:p>
+          <a:p>
+            <a:pPr lvl="0" indent="0" marL="1270000">
+              <a:buNone/>
+            </a:pPr>
+            <a:r>
+              <a:rPr sz="2000"/>
+              <a:t>Note you need to test each groups separately…</a:t>
+            </a:r>
+          </a:p>
+          <a:p>
+            <a:pPr lvl="0" indent="0" marL="1270000">
+              <a:buNone/>
+            </a:pPr>
+          </a:p>
+          <a:p>
+            <a:pPr lvl="0" indent="0" marL="1270000">
+              <a:buNone/>
+            </a:pPr>
+            <a:r>
+              <a:rPr sz="2000" b="1"/>
+              <a:t>Practice Exercise 7: Test normality of windward pine needle lengths</a:t>
+            </a:r>
+          </a:p>
+          <a:p>
+            <a:pPr lvl="0" indent="0" marL="1270000">
+              <a:buNone/>
+            </a:pPr>
+            <a:r>
+              <a:rPr sz="2000"/>
+              <a:t>qqplots</a:t>
+            </a:r>
+          </a:p>
+          <a:p>
+            <a:pPr lvl="0" indent="0" marL="1270000">
+              <a:buNone/>
+            </a:pPr>
+            <a:r>
+              <a:rPr sz="2000"/>
+              <a:t>Note you need to test each groups separately…</a:t>
+            </a:r>
+          </a:p>
+          <a:p>
+            <a:pPr lvl="0" indent="0">
+              <a:buNone/>
+            </a:pPr>
+            <a:r>
+              <a:rPr sz="2000">
+                <a:latin typeface="Courier"/>
+              </a:rPr>
+              <a:t># A tibble: 6 × 6
+  date    group       n_s   wind  tree_no length_mm
+  &lt;chr&gt;   &lt;chr&gt;       &lt;chr&gt; &lt;chr&gt;   &lt;dbl&gt;     &lt;dbl&gt;
+1 3/20/25 cephalopods n     lee         1        20
+2 3/20/25 cephalopods n     lee         1        21
+3 3/20/25 cephalopods n     lee         1        23
+4 3/20/25 cephalopods n     lee         1        25
+5 3/20/25 cephalopods n     lee         1        21
+6 3/20/25 cephalopods n     lee         1        16</a:t>
+            </a:r>
+          </a:p>
+          <a:p>
+            <a:pPr lvl="0" indent="0" marL="1270000">
+              <a:buNone/>
+            </a:pPr>
+            <a:r>
+              <a:rPr sz="2000" b="1"/>
+              <a:t>Practice Exercise 8: Test normality of windward pine needle lengths</a:t>
+            </a:r>
+          </a:p>
+          <a:p>
+            <a:pPr lvl="0" indent="0" marL="1270000">
+              <a:buNone/>
+            </a:pPr>
+            <a:r>
+              <a:rPr sz="2000"/>
+              <a:t>qqplots</a:t>
+            </a:r>
+          </a:p>
+          <a:p>
+            <a:pPr lvl="0" indent="0" marL="1270000">
+              <a:buNone/>
+            </a:pPr>
+            <a:r>
+              <a:rPr sz="2000"/>
+              <a:t>Note you need to test each groups separately…</a:t>
+            </a:r>
+          </a:p>
+          <a:p>
+            <a:pPr lvl="0" indent="0" marL="1270000">
+              <a:buNone/>
+            </a:pPr>
+          </a:p>
+          <a:p>
+            <a:pPr lvl="0" indent="0">
+              <a:buNone/>
+            </a:pPr>
+            <a:r>
+              <a:rPr sz="2000">
+                <a:latin typeface="Courier"/>
+              </a:rPr>
+              <a:t>[1] 21 22</a:t>
+            </a:r>
+          </a:p>
+          <a:p>
+            <a:pPr lvl="0" indent="0" marL="1270000">
+              <a:buNone/>
+            </a:pPr>
+            <a:r>
+              <a:rPr sz="2000" b="1"/>
+              <a:t>Practice Exercise 9: Test normality of windward pine needle lengths</a:t>
+            </a:r>
+          </a:p>
+          <a:p>
+            <a:pPr lvl="0" indent="0" marL="1270000">
+              <a:buNone/>
+            </a:pPr>
+            <a:r>
+              <a:rPr sz="2000"/>
+              <a:t>Shapiro-Wilk test</a:t>
+            </a:r>
+          </a:p>
+          <a:p>
+            <a:pPr lvl="0" indent="0" marL="1270000">
+              <a:buNone/>
+            </a:pPr>
+            <a:r>
+              <a:rPr sz="2000"/>
+              <a:t>Note you need to test each groups separately…</a:t>
+            </a:r>
+          </a:p>
+          <a:p>
+            <a:pPr lvl="0" indent="0">
+              <a:buNone/>
+            </a:pPr>
+            <a:r>
+              <a:rPr sz="2000">
+                <a:latin typeface="Courier"/>
+              </a:rPr>
+              <a:t>[1] "Shapiro-Wilk test for windward data:"</a:t>
+            </a:r>
+          </a:p>
+          <a:p>
+            <a:pPr lvl="0" indent="0">
+              <a:buNone/>
+            </a:pPr>
+            <a:r>
+              <a:rPr sz="2000">
+                <a:latin typeface="Courier"/>
+              </a:rPr>
+              <a:t>
+    Shapiro-Wilk normality test
+data:  windward_data$length_mm
+W = 0.96062, p-value = 0.451</a:t>
+            </a:r>
+          </a:p>
+          <a:p>
+            <a:pPr lvl="0" indent="0" marL="1270000">
+              <a:buNone/>
+            </a:pPr>
+            <a:r>
+              <a:rPr sz="2000" b="1"/>
+              <a:t>Practice Exercise 10: Test normality of windward pine needle lengths</a:t>
+            </a:r>
+          </a:p>
+          <a:p>
+            <a:pPr lvl="0" indent="0" marL="1270000">
+              <a:buNone/>
+            </a:pPr>
+            <a:r>
+              <a:rPr sz="2000"/>
+              <a:t>qqplots</a:t>
+            </a:r>
+          </a:p>
+          <a:p>
+            <a:pPr lvl="0" indent="0" marL="1270000">
+              <a:buNone/>
+            </a:pPr>
+            <a:r>
+              <a:rPr sz="2000"/>
+              <a:t>Note you need to test each groups separately…</a:t>
+            </a:r>
+          </a:p>
+          <a:p>
+            <a:pPr lvl="0" indent="0" marL="1270000">
+              <a:buNone/>
+            </a:pPr>
+          </a:p>
+          <a:p>
+            <a:pPr lvl="0" indent="0">
+              <a:buNone/>
+            </a:pPr>
+            <a:r>
+              <a:rPr sz="2000">
+                <a:latin typeface="Courier"/>
+              </a:rPr>
+              <a:t>[1]  4 16</a:t>
+            </a:r>
+          </a:p>
+          <a:p>
+            <a:pPr lvl="0" indent="0" marL="1270000">
+              <a:buNone/>
+            </a:pPr>
+            <a:r>
+              <a:rPr sz="2000" b="1"/>
+              <a:t>Practice Exercise 11: Test normality of windward pine needle lengths</a:t>
+            </a:r>
+          </a:p>
+          <a:p>
+            <a:pPr lvl="0" indent="0" marL="1270000">
+              <a:buNone/>
+            </a:pPr>
+            <a:r>
+              <a:rPr sz="2000"/>
+              <a:t>Shapiro-Wilk test</a:t>
+            </a:r>
+          </a:p>
+          <a:p>
+            <a:pPr lvl="0" indent="0" marL="1270000">
+              <a:buNone/>
+            </a:pPr>
+            <a:r>
+              <a:rPr sz="2000"/>
+              <a:t>Note you need to test each groups separately…</a:t>
+            </a:r>
+          </a:p>
+          <a:p>
+            <a:pPr lvl="0" indent="0">
+              <a:buNone/>
+            </a:pPr>
+            <a:r>
+              <a:rPr sz="2000">
+                <a:latin typeface="Courier"/>
+              </a:rPr>
+              <a:t>[1] "Shapiro-Wilk test for leeward data:"</a:t>
+            </a:r>
+          </a:p>
+          <a:p>
+            <a:pPr lvl="0" indent="0">
+              <a:buNone/>
+            </a:pPr>
+            <a:r>
+              <a:rPr sz="2000">
+                <a:latin typeface="Courier"/>
+              </a:rPr>
+              <a:t>
+    Shapiro-Wilk normality test
+data:  leeward_data$length_mm
+W = 0.95477, p-value = 0.3425</a:t>
+            </a:r>
+          </a:p>
+          <a:p>
+            <a:pPr lvl="0" indent="0" marL="1270000">
+              <a:buNone/>
+            </a:pPr>
+            <a:r>
+              <a:rPr sz="2000" b="1"/>
+              <a:t>Practice Exercise 12: Test Normality at one time</a:t>
+            </a:r>
+          </a:p>
+          <a:p>
+            <a:pPr lvl="0" indent="0" marL="1270000">
+              <a:buNone/>
+            </a:pPr>
+            <a:r>
+              <a:rPr sz="2000"/>
+              <a:t>There are always a lot of ways to do this in R</a:t>
+            </a:r>
+          </a:p>
+          <a:p>
+            <a:pPr lvl="0" indent="0">
+              <a:buNone/>
+            </a:pPr>
+            <a:r>
+              <a:rPr sz="2000">
+                <a:latin typeface="Courier"/>
+              </a:rPr>
+              <a:t># A tibble: 2 × 4
+  wind  shapiro_stat shapiro_p_value normal_distribution
+  &lt;chr&gt;        &lt;dbl&gt;           &lt;dbl&gt; &lt;chr&gt;              
+1 lee          0.955           0.343 Normal             
+2 wind         0.961           0.451 Normal             </a:t>
+            </a:r>
+          </a:p>
+          <a:p>
+            <a:pPr lvl="0" indent="0" marL="1270000">
+              <a:buNone/>
+            </a:pPr>
+            <a:r>
+              <a:rPr sz="2000" b="1"/>
+              <a:t>Practice Exercise 13: Test equal variances</a:t>
+            </a:r>
+          </a:p>
+          <a:p>
+            <a:pPr lvl="0" indent="0" marL="1270000">
+              <a:buNone/>
+            </a:pPr>
+            <a:r>
+              <a:rPr sz="2000"/>
+              <a:t>Levenes test can be done on the original dataframe</a:t>
+            </a:r>
+          </a:p>
+          <a:p>
+            <a:pPr lvl="0" indent="0">
+              <a:buNone/>
+            </a:pPr>
+            <a:r>
+              <a:rPr sz="2000">
+                <a:latin typeface="Courier"/>
+              </a:rPr>
+              <a:t>[1] "Levene's Test for Homogeneity of Variance:"</a:t>
+            </a:r>
+          </a:p>
+          <a:p>
+            <a:pPr lvl="0" indent="0">
+              <a:buNone/>
+            </a:pPr>
+            <a:r>
+              <a:rPr sz="2000">
+                <a:latin typeface="Courier"/>
+              </a:rPr>
+              <a:t>Levene's Test for Homogeneity of Variance (center = median)
+      Df F value Pr(&gt;F)
+group  1  1.2004 0.2789
+      46               </a:t>
+            </a:r>
+          </a:p>
+        </p:txBody>
+      </p:sp>
+    </p:spTree>
+  </p:cSld>
+</p:sld>
+</file>
+
+<file path=ppt/slides/slide3.xml><?xml version="1.0" encoding="utf-8"?>
+<p:sld xmlns:a="http://schemas.openxmlformats.org/drawingml/2006/main" xmlns:r="http://schemas.openxmlformats.org/officeDocument/2006/relationships" xmlns:p="http://schemas.openxmlformats.org/presentationml/2006/main">
+  <p:cSld>
+    <p:spTree>
+      <p:nvGrpSpPr>
+        <p:cNvPr id="1" name=""/>
+        <p:cNvGrpSpPr/>
+        <p:nvPr/>
+      </p:nvGrpSpPr>
+      <p:grpSpPr>
+        <a:xfrm>
+          <a:off x="0" y="0"/>
+          <a:ext cx="0" cy="0"/>
+          <a:chOff x="0" y="0"/>
+          <a:chExt cx="0" cy="0"/>
+        </a:xfrm>
+      </p:grpSpPr>
+      <p:sp>
+        <p:nvSpPr>
+          <p:cNvPr id="3" name="Content Placeholder 2"/>
+          <p:cNvSpPr>
+            <a:spLocks noGrp="1"/>
+          </p:cNvSpPr>
+          <p:nvPr>
+            <p:ph idx="1"/>
+          </p:nvPr>
+        </p:nvSpPr>
+        <p:spPr/>
+        <p:txBody>
+          <a:bodyPr/>
+          <a:lstStyle/>
+          <a:p>
+            <a:pPr lvl="0" indent="0" marL="0">
+              <a:spcBef>
+                <a:spcPts val="3000"/>
+              </a:spcBef>
+              <a:buNone/>
+            </a:pPr>
+            <a:r>
+              <a:rPr b="1"/>
+              <a:t>Lecture 4: Review</a:t>
+            </a:r>
+          </a:p>
+        </p:txBody>
+      </p:sp>
+    </p:spTree>
+  </p:cSld>
+</p:sld>
+</file>
+
+<file path=ppt/slides/slide30.xml><?xml version="1.0" encoding="utf-8"?>
+<p:sld xmlns:a="http://schemas.openxmlformats.org/drawingml/2006/main" xmlns:r="http://schemas.openxmlformats.org/officeDocument/2006/relationships" xmlns:p="http://schemas.openxmlformats.org/presentationml/2006/main">
+  <p:cSld>
+    <p:spTree>
+      <p:nvGrpSpPr>
+        <p:cNvPr id="1" name=""/>
+        <p:cNvGrpSpPr/>
+        <p:nvPr/>
+      </p:nvGrpSpPr>
+      <p:grpSpPr>
+        <a:xfrm>
+          <a:off x="0" y="0"/>
+          <a:ext cx="0" cy="0"/>
+          <a:chOff x="0" y="0"/>
+          <a:chExt cx="0" cy="0"/>
+        </a:xfrm>
+      </p:grpSpPr>
+      <p:sp>
+        <p:nvSpPr>
+          <p:cNvPr id="2" name="Title 1"/>
+          <p:cNvSpPr>
+            <a:spLocks noGrp="1"/>
+          </p:cNvSpPr>
+          <p:nvPr>
+            <p:ph type="title"/>
+          </p:nvPr>
+        </p:nvSpPr>
+        <p:spPr>
+          <a:xfrm>
+            <a:off x="0" y="0"/>
+            <a:ext cx="9144000" cy="602780"/>
+          </a:xfrm>
+          <a:solidFill>
+            <a:srgbClr val="70121D"/>
+          </a:solidFill>
+        </p:spPr>
+        <p:txBody>
+          <a:bodyPr/>
+          <a:lstStyle/>
+          <a:p>
+            <a:pPr lvl="0" indent="0" marL="0">
+              <a:buNone/>
+            </a:pPr>
+            <a:r>
+              <a:rPr b="1"/>
+              <a:t>Lecture 5:</a:t>
+            </a:r>
+            <a:r>
+              <a:rPr/>
+              <a:t> Conducting the Two-Sample T-Test</a:t>
+            </a:r>
+          </a:p>
+        </p:txBody>
+      </p:sp>
+      <p:sp>
+        <p:nvSpPr>
+          <p:cNvPr id="3" name="Content Placeholder 2"/>
+          <p:cNvSpPr>
+            <a:spLocks noGrp="1"/>
+          </p:cNvSpPr>
+          <p:nvPr>
+            <p:ph idx="1" sz="half"/>
+          </p:nvPr>
+        </p:nvSpPr>
+        <p:spPr/>
+        <p:txBody>
+          <a:bodyPr/>
+          <a:lstStyle/>
+          <a:p>
+            <a:pPr lvl="0" indent="0" marL="0">
+              <a:buNone/>
+            </a:pPr>
+            <a:r>
+              <a:rPr/>
+              <a:t>Now we can compare the mean pine needle lengths between windward and leeward sides.</a:t>
+            </a:r>
+          </a:p>
+          <a:p>
+            <a:pPr lvl="0" indent="0" marL="0">
+              <a:buNone/>
+            </a:pPr>
+            <a:r>
+              <a:rPr/>
+              <a:t>Ho: μ₁ = μ₂ (The mean needle lengths are equal)</a:t>
+            </a:r>
+          </a:p>
+          <a:p>
+            <a:pPr lvl="0" indent="0" marL="0">
+              <a:buNone/>
+            </a:pPr>
+            <a:r>
+              <a:rPr/>
+              <a:t>Ha: μ₁ ≠ μ₂ (The mean needle lengths are different)</a:t>
+            </a:r>
+          </a:p>
+          <a:p>
+            <a:pPr lvl="0" indent="0" marL="0">
+              <a:buNone/>
+            </a:pPr>
+            <a:r>
+              <a:rPr/>
+              <a:t>Deciding between:</a:t>
+            </a:r>
+          </a:p>
+          <a:p>
+            <a:pPr lvl="0"/>
+            <a:r>
+              <a:rPr/>
+              <a:t>Standard t-test (equal variances)</a:t>
+            </a:r>
+          </a:p>
+          <a:p>
+            <a:pPr lvl="0"/>
+            <a:r>
+              <a:rPr/>
+              <a:t>Welch’s t-test (unequal variances)</a:t>
+            </a:r>
+          </a:p>
+          <a:p>
+            <a:pPr lvl="0" indent="0" marL="0">
+              <a:buNone/>
+            </a:pPr>
+            <a:r>
+              <a:rPr b="1"/>
+              <a:t>Note the Levenes Test should be NOT SIGNIFICANT - What is the null hypothesis</a:t>
+            </a:r>
+          </a:p>
+        </p:txBody>
+      </p:sp>
+      <p:sp>
+        <p:nvSpPr>
+          <p:cNvPr id="4" name="Content Placeholder 3"/>
+          <p:cNvSpPr>
+            <a:spLocks noGrp="1"/>
+          </p:cNvSpPr>
+          <p:nvPr>
+            <p:ph idx="2" sz="half"/>
+          </p:nvPr>
+        </p:nvSpPr>
+        <p:spPr/>
+        <p:txBody>
+          <a:bodyPr/>
+          <a:lstStyle/>
+          <a:p>
+            <a:pPr lvl="0" indent="0">
+              <a:buNone/>
+            </a:pPr>
+            <a:r>
+              <a:rPr>
+                <a:latin typeface="Courier"/>
+              </a:rPr>
+              <a:t>Levene's Test for Homogeneity of Variance (center = median)
+      Df F value Pr(&gt;F)
+group  1  1.2004 0.2789
+      46               </a:t>
+            </a:r>
+          </a:p>
+        </p:txBody>
+      </p:sp>
+    </p:spTree>
+  </p:cSld>
+</p:sld>
+</file>
+
 <file path=ppt/slides/slide31.xml><?xml version="1.0" encoding="utf-8"?>
 <p:sld xmlns:a="http://schemas.openxmlformats.org/drawingml/2006/main" xmlns:r="http://schemas.openxmlformats.org/officeDocument/2006/relationships" xmlns:p="http://schemas.openxmlformats.org/presentationml/2006/main">
   <p:cSld>
@@ -6881,121 +7196,6 @@
       </p:grpSpPr>
       <p:sp>
         <p:nvSpPr>
-          <p:cNvPr id="3" name="Content Placeholder 2"/>
-          <p:cNvSpPr>
-            <a:spLocks noGrp="1"/>
-          </p:cNvSpPr>
-          <p:nvPr>
-            <p:ph idx="1"/>
-          </p:nvPr>
-        </p:nvSpPr>
-        <p:spPr/>
-        <p:txBody>
-          <a:bodyPr/>
-          <a:lstStyle/>
-          <a:p>
-            <a:pPr lvl="0" indent="0" marL="1270000">
-              <a:buNone/>
-            </a:pPr>
-            <a:r>
-              <a:rPr sz="2000" b="1"/>
-              <a:t>Practice Exercise 4: Effect size</a:t>
-            </a:r>
-          </a:p>
-          <a:p>
-            <a:pPr lvl="0" indent="0" marL="1270000">
-              <a:buNone/>
-            </a:pPr>
-            <a:r>
-              <a:rPr sz="2000"/>
-              <a:t>We could also look at the difference in means… some cool code here</a:t>
-            </a:r>
-          </a:p>
-          <a:p>
-            <a:pPr lvl="0" indent="0">
-              <a:buNone/>
-            </a:pPr>
-            <a:r>
-              <a:rPr sz="2000">
-                <a:latin typeface="Courier"/>
-              </a:rPr>
-              <a:t># A tibble: 1 × 1
-  difference
-       &lt;dbl&gt;
-1       -5.5</a:t>
-            </a:r>
-          </a:p>
-          <a:p>
-            <a:pPr lvl="0" indent="0" marL="1270000">
-              <a:buNone/>
-            </a:pPr>
-            <a:r>
-              <a:rPr sz="2000" b="1"/>
-              <a:t>Practice Exercise 5: Using GGPLOT to get summary stats</a:t>
-            </a:r>
-          </a:p>
-          <a:p>
-            <a:pPr lvl="0" indent="0" marL="1270000">
-              <a:buNone/>
-            </a:pPr>
-            <a:r>
-              <a:rPr sz="2000"/>
-              <a:t>GGplot also has code to make the mean and standard error plots we are interested in along whit a lot of others</a:t>
-            </a:r>
-          </a:p>
-          <a:p>
-            <a:pPr lvl="0" indent="0" marL="1270000">
-              <a:buNone/>
-            </a:pPr>
-          </a:p>
-        </p:txBody>
-      </p:sp>
-    </p:spTree>
-  </p:cSld>
-</p:sld>
-</file>
-
-<file path=ppt/slides/slide32.xml><?xml version="1.0" encoding="utf-8"?>
-<p:sld xmlns:a="http://schemas.openxmlformats.org/drawingml/2006/main" xmlns:r="http://schemas.openxmlformats.org/officeDocument/2006/relationships" xmlns:p="http://schemas.openxmlformats.org/presentationml/2006/main">
-  <p:cSld>
-    <p:spTree>
-      <p:nvGrpSpPr>
-        <p:cNvPr id="1" name=""/>
-        <p:cNvGrpSpPr/>
-        <p:nvPr/>
-      </p:nvGrpSpPr>
-      <p:grpSpPr>
-        <a:xfrm>
-          <a:off x="0" y="0"/>
-          <a:ext cx="0" cy="0"/>
-          <a:chOff x="0" y="0"/>
-          <a:chExt cx="0" cy="0"/>
-        </a:xfrm>
-      </p:grpSpPr>
-    </p:spTree>
-  </p:cSld>
-</p:sld>
-</file>
-
-<file path=ppt/slides/slide33.xml><?xml version="1.0" encoding="utf-8"?>
-<p:sld xmlns:a="http://schemas.openxmlformats.org/drawingml/2006/main" xmlns:r="http://schemas.openxmlformats.org/officeDocument/2006/relationships" xmlns:p="http://schemas.openxmlformats.org/presentationml/2006/main">
-  <p:cSld>
-    <p:spTree>
-      <p:nvGrpSpPr>
-        <p:cNvPr id="1" name=""/>
-        <p:cNvGrpSpPr/>
-        <p:nvPr/>
-      </p:nvGrpSpPr>
-      <p:grpSpPr>
-        <a:xfrm>
-          <a:off x="0" y="0"/>
-          <a:ext cx="0" cy="0"/>
-          <a:chOff x="0" y="0"/>
-          <a:chExt cx="0" cy="0"/>
-        </a:xfrm>
-      </p:grpSpPr>
-      <p:sp>
-        <p:nvSpPr>
           <p:cNvPr id="2" name="Title 1"/>
           <p:cNvSpPr>
             <a:spLocks noGrp="1"/>
@@ -7023,7 +7223,7 @@
             </a:r>
             <a:r>
               <a:rPr/>
-              <a:t> Testing Assumptions for Two-Sample T-Test</a:t>
+              <a:t> Conducting the Two-Sample T-Test</a:t>
             </a:r>
           </a:p>
         </p:txBody>
@@ -7048,34 +7248,7 @@
             </a:pPr>
             <a:r>
               <a:rPr/>
-              <a:t>For a two-sample t-test, we need to check:</a:t>
-            </a:r>
-          </a:p>
-          <a:p>
-            <a:pPr lvl="0" indent="-342900" marL="342900">
-              <a:buAutoNum type="arabicPeriod"/>
-            </a:pPr>
-            <a:r>
-              <a:rPr/>
-              <a:t>Normality within each group</a:t>
-            </a:r>
-          </a:p>
-          <a:p>
-            <a:pPr lvl="0" indent="-342900" marL="342900">
-              <a:buAutoNum type="arabicPeriod"/>
-            </a:pPr>
-            <a:r>
-              <a:rPr/>
-              <a:t>Equal variances between groups (for standard t-test)</a:t>
-            </a:r>
-          </a:p>
-          <a:p>
-            <a:pPr lvl="0" indent="-342900" marL="342900">
-              <a:buAutoNum type="arabicPeriod"/>
-            </a:pPr>
-            <a:r>
-              <a:rPr/>
-              <a:t>Independent observations</a:t>
+              <a:t>Now we can do a two sample TTEST</a:t>
             </a:r>
           </a:p>
           <a:p>
@@ -7084,21 +7257,25 @@
             </a:pPr>
             <a:r>
               <a:rPr/>
-              <a:t>If assumptions are violated:</a:t>
-            </a:r>
-          </a:p>
-          <a:p>
-            <a:pPr lvl="0"/>
-            <a:r>
-              <a:rPr/>
-              <a:t>Welch’s t-test (unequal variances)</a:t>
-            </a:r>
-          </a:p>
-          <a:p>
-            <a:pPr lvl="0"/>
-            <a:r>
-              <a:rPr/>
-              <a:t>Non-parametric alternatives (Mann-Whitney U test)</a:t>
+              <a:t>Calculate t-statistic manually (optional)</a:t>
+            </a:r>
+          </a:p>
+          <a:p>
+            <a:pPr lvl="0" indent="0" marL="0">
+              <a:buNone/>
+            </a:pPr>
+            <a:r>
+              <a:rPr/>
+              <a:t>YOUR CODE HERE:</a:t>
+            </a:r>
+          </a:p>
+          <a:p>
+            <a:pPr lvl="0" indent="0" marL="0">
+              <a:buNone/>
+            </a:pPr>
+            <a:r>
+              <a:rPr/>
+              <a:t>t = (mean1 - mean2) / sqrt((s1^2/n1) + (s2^2/n2))</a:t>
             </a:r>
           </a:p>
           <a:p>
@@ -7107,57 +7284,7 @@
             </a:pPr>
             <a:r>
               <a:rPr sz="2000" b="1"/>
-              <a:t>Practice Exercise 6: Test normality of windward pine needle lengths</a:t>
-            </a:r>
-          </a:p>
-          <a:p>
-            <a:pPr lvl="0" indent="0" marL="1270000">
-              <a:buNone/>
-            </a:pPr>
-            <a:r>
-              <a:rPr sz="2000"/>
-              <a:t>qqplots</a:t>
-            </a:r>
-          </a:p>
-          <a:p>
-            <a:pPr lvl="0" indent="0" marL="1270000">
-              <a:buNone/>
-            </a:pPr>
-            <a:r>
-              <a:rPr sz="2000"/>
-              <a:t>Note you need to test each groups separately…</a:t>
-            </a:r>
-          </a:p>
-          <a:p>
-            <a:pPr lvl="0" indent="0" marL="1270000">
-              <a:buNone/>
-            </a:pPr>
-          </a:p>
-          <a:p>
-            <a:pPr lvl="0" indent="0" marL="1270000">
-              <a:buNone/>
-            </a:pPr>
-            <a:r>
-              <a:rPr sz="2000" b="1"/>
-              <a:t>Practice Exercise 7: Test normality of windward pine needle lengths</a:t>
-            </a:r>
-          </a:p>
-          <a:p>
-            <a:pPr lvl="0" indent="0" marL="1270000">
-              <a:buNone/>
-            </a:pPr>
-            <a:r>
-              <a:rPr sz="2000"/>
-              <a:t>qqplots</a:t>
-            </a:r>
-          </a:p>
-          <a:p>
-            <a:pPr lvl="0" indent="0" marL="1270000">
-              <a:buNone/>
-            </a:pPr>
-            <a:r>
-              <a:rPr sz="2000"/>
-              <a:t>Note you need to test each groups separately…</a:t>
+              <a:t>Tip</a:t>
             </a:r>
           </a:p>
           <a:p>
@@ -7168,48 +7295,8 @@
               <a:rPr sz="2000">
                 <a:latin typeface="Courier"/>
               </a:rPr>
-              <a:t># A tibble: 6 × 6
-  date    group       n_s   wind  tree_no length_mm
-  &lt;chr&gt;   &lt;chr&gt;       &lt;chr&gt; &lt;chr&gt;   &lt;dbl&gt;     &lt;dbl&gt;
-1 3/20/25 cephalopods n     lee         1        20
-2 3/20/25 cephalopods n     lee         1        21
-3 3/20/25 cephalopods n     lee         1        23
-4 3/20/25 cephalopods n     lee         1        25
-5 3/20/25 cephalopods n     lee         1        21
-6 3/20/25 cephalopods n     lee         1        16</a:t>
-            </a:r>
-          </a:p>
-          <a:p>
-            <a:pPr lvl="0" indent="0" marL="1270000">
-              <a:buNone/>
-            </a:pPr>
-            <a:r>
-              <a:rPr sz="2000" b="1"/>
-              <a:t>Practice Exercise 8: Test normality of windward pine needle lengths</a:t>
-            </a:r>
-          </a:p>
-          <a:p>
-            <a:pPr lvl="0" indent="0" marL="1270000">
-              <a:buNone/>
-            </a:pPr>
-            <a:r>
-              <a:rPr sz="2000"/>
-              <a:t>qqplots</a:t>
-            </a:r>
-          </a:p>
-          <a:p>
-            <a:pPr lvl="0" indent="0" marL="1270000">
-              <a:buNone/>
-            </a:pPr>
-            <a:r>
-              <a:rPr sz="2000"/>
-              <a:t>Note you need to test each groups separately…</a:t>
-            </a:r>
-          </a:p>
-          <a:p>
-            <a:pPr lvl="0" indent="0" marL="1270000">
-              <a:buNone/>
-            </a:pPr>
+              <a:t>[1] "Standard two-sample t-test:"</a:t>
+            </a:r>
           </a:p>
           <a:p>
             <a:pPr lvl="0" indent="0">
@@ -7217,542 +7304,6 @@
             </a:pPr>
             <a:r>
               <a:rPr sz="2000">
-                <a:latin typeface="Courier"/>
-              </a:rPr>
-              <a:t>[1] 21 22</a:t>
-            </a:r>
-          </a:p>
-          <a:p>
-            <a:pPr lvl="0" indent="0" marL="1270000">
-              <a:buNone/>
-            </a:pPr>
-            <a:r>
-              <a:rPr sz="2000" b="1"/>
-              <a:t>Practice Exercise 9: Test normality of windward pine needle lengths</a:t>
-            </a:r>
-          </a:p>
-          <a:p>
-            <a:pPr lvl="0" indent="0" marL="1270000">
-              <a:buNone/>
-            </a:pPr>
-            <a:r>
-              <a:rPr sz="2000"/>
-              <a:t>Shapiro-Wilk test</a:t>
-            </a:r>
-          </a:p>
-          <a:p>
-            <a:pPr lvl="0" indent="0" marL="1270000">
-              <a:buNone/>
-            </a:pPr>
-            <a:r>
-              <a:rPr sz="2000"/>
-              <a:t>Note you need to test each groups separately…</a:t>
-            </a:r>
-          </a:p>
-          <a:p>
-            <a:pPr lvl="0" indent="0">
-              <a:buNone/>
-            </a:pPr>
-            <a:r>
-              <a:rPr sz="2000">
-                <a:latin typeface="Courier"/>
-              </a:rPr>
-              <a:t>[1] "Shapiro-Wilk test for windward data:"</a:t>
-            </a:r>
-          </a:p>
-          <a:p>
-            <a:pPr lvl="0" indent="0">
-              <a:buNone/>
-            </a:pPr>
-            <a:r>
-              <a:rPr sz="2000">
-                <a:latin typeface="Courier"/>
-              </a:rPr>
-              <a:t>
-    Shapiro-Wilk normality test
-data:  windward_data$length_mm
-W = 0.96062, p-value = 0.451</a:t>
-            </a:r>
-          </a:p>
-          <a:p>
-            <a:pPr lvl="0" indent="0" marL="1270000">
-              <a:buNone/>
-            </a:pPr>
-            <a:r>
-              <a:rPr sz="2000" b="1"/>
-              <a:t>Practice Exercise 10: Test normality of windward pine needle lengths</a:t>
-            </a:r>
-          </a:p>
-          <a:p>
-            <a:pPr lvl="0" indent="0" marL="1270000">
-              <a:buNone/>
-            </a:pPr>
-            <a:r>
-              <a:rPr sz="2000"/>
-              <a:t>qqplots</a:t>
-            </a:r>
-          </a:p>
-          <a:p>
-            <a:pPr lvl="0" indent="0" marL="1270000">
-              <a:buNone/>
-            </a:pPr>
-            <a:r>
-              <a:rPr sz="2000"/>
-              <a:t>Note you need to test each groups separately…</a:t>
-            </a:r>
-          </a:p>
-          <a:p>
-            <a:pPr lvl="0" indent="0" marL="1270000">
-              <a:buNone/>
-            </a:pPr>
-          </a:p>
-          <a:p>
-            <a:pPr lvl="0" indent="0">
-              <a:buNone/>
-            </a:pPr>
-            <a:r>
-              <a:rPr sz="2000">
-                <a:latin typeface="Courier"/>
-              </a:rPr>
-              <a:t>[1]  4 16</a:t>
-            </a:r>
-          </a:p>
-          <a:p>
-            <a:pPr lvl="0" indent="0" marL="1270000">
-              <a:buNone/>
-            </a:pPr>
-            <a:r>
-              <a:rPr sz="2000" b="1"/>
-              <a:t>Practice Exercise 11: Test normality of windward pine needle lengths</a:t>
-            </a:r>
-          </a:p>
-          <a:p>
-            <a:pPr lvl="0" indent="0" marL="1270000">
-              <a:buNone/>
-            </a:pPr>
-            <a:r>
-              <a:rPr sz="2000"/>
-              <a:t>Shapiro-Wilk test</a:t>
-            </a:r>
-          </a:p>
-          <a:p>
-            <a:pPr lvl="0" indent="0" marL="1270000">
-              <a:buNone/>
-            </a:pPr>
-            <a:r>
-              <a:rPr sz="2000"/>
-              <a:t>Note you need to test each groups separately…</a:t>
-            </a:r>
-          </a:p>
-          <a:p>
-            <a:pPr lvl="0" indent="0">
-              <a:buNone/>
-            </a:pPr>
-            <a:r>
-              <a:rPr sz="2000">
-                <a:latin typeface="Courier"/>
-              </a:rPr>
-              <a:t>[1] "Shapiro-Wilk test for leeward data:"</a:t>
-            </a:r>
-          </a:p>
-          <a:p>
-            <a:pPr lvl="0" indent="0">
-              <a:buNone/>
-            </a:pPr>
-            <a:r>
-              <a:rPr sz="2000">
-                <a:latin typeface="Courier"/>
-              </a:rPr>
-              <a:t>
-    Shapiro-Wilk normality test
-data:  leeward_data$length_mm
-W = 0.95477, p-value = 0.3425</a:t>
-            </a:r>
-          </a:p>
-          <a:p>
-            <a:pPr lvl="0" indent="0" marL="1270000">
-              <a:buNone/>
-            </a:pPr>
-            <a:r>
-              <a:rPr sz="2000" b="1"/>
-              <a:t>Practice Exercise 12: Test Normality at one time</a:t>
-            </a:r>
-          </a:p>
-          <a:p>
-            <a:pPr lvl="0" indent="0" marL="1270000">
-              <a:buNone/>
-            </a:pPr>
-            <a:r>
-              <a:rPr sz="2000"/>
-              <a:t>There are always a lot of ways to do this in R</a:t>
-            </a:r>
-          </a:p>
-          <a:p>
-            <a:pPr lvl="0" indent="0">
-              <a:buNone/>
-            </a:pPr>
-            <a:r>
-              <a:rPr sz="2000">
-                <a:latin typeface="Courier"/>
-              </a:rPr>
-              <a:t># A tibble: 2 × 4
-  wind  shapiro_stat shapiro_p_value normal_distribution
-  &lt;chr&gt;        &lt;dbl&gt;           &lt;dbl&gt; &lt;chr&gt;              
-1 lee          0.955           0.343 Normal             
-2 wind         0.961           0.451 Normal             </a:t>
-            </a:r>
-          </a:p>
-          <a:p>
-            <a:pPr lvl="0" indent="0" marL="1270000">
-              <a:buNone/>
-            </a:pPr>
-            <a:r>
-              <a:rPr sz="2000" b="1"/>
-              <a:t>Practice Exercise 13: Test equal variances</a:t>
-            </a:r>
-          </a:p>
-          <a:p>
-            <a:pPr lvl="0" indent="0" marL="1270000">
-              <a:buNone/>
-            </a:pPr>
-            <a:r>
-              <a:rPr sz="2000"/>
-              <a:t>Levenes test can be done on the original dataframe</a:t>
-            </a:r>
-          </a:p>
-          <a:p>
-            <a:pPr lvl="0" indent="0">
-              <a:buNone/>
-            </a:pPr>
-            <a:r>
-              <a:rPr sz="2000">
-                <a:latin typeface="Courier"/>
-              </a:rPr>
-              <a:t>[1] "Levene's Test for Homogeneity of Variance:"</a:t>
-            </a:r>
-          </a:p>
-          <a:p>
-            <a:pPr lvl="0" indent="0">
-              <a:buNone/>
-            </a:pPr>
-            <a:r>
-              <a:rPr sz="2000">
-                <a:latin typeface="Courier"/>
-              </a:rPr>
-              <a:t>Levene's Test for Homogeneity of Variance (center = median)
-      Df F value Pr(&gt;F)
-group  1  1.2004 0.2789
-      46               </a:t>
-            </a:r>
-          </a:p>
-        </p:txBody>
-      </p:sp>
-    </p:spTree>
-  </p:cSld>
-</p:sld>
-</file>
-
-<file path=ppt/slides/slide34.xml><?xml version="1.0" encoding="utf-8"?>
-<p:sld xmlns:a="http://schemas.openxmlformats.org/drawingml/2006/main" xmlns:r="http://schemas.openxmlformats.org/officeDocument/2006/relationships" xmlns:p="http://schemas.openxmlformats.org/presentationml/2006/main">
-  <p:cSld>
-    <p:spTree>
-      <p:nvGrpSpPr>
-        <p:cNvPr id="1" name=""/>
-        <p:cNvGrpSpPr/>
-        <p:nvPr/>
-      </p:nvGrpSpPr>
-      <p:grpSpPr>
-        <a:xfrm>
-          <a:off x="0" y="0"/>
-          <a:ext cx="0" cy="0"/>
-          <a:chOff x="0" y="0"/>
-          <a:chExt cx="0" cy="0"/>
-        </a:xfrm>
-      </p:grpSpPr>
-      <p:sp>
-        <p:nvSpPr>
-          <p:cNvPr id="2" name="Title 1"/>
-          <p:cNvSpPr>
-            <a:spLocks noGrp="1"/>
-          </p:cNvSpPr>
-          <p:nvPr>
-            <p:ph type="title"/>
-          </p:nvPr>
-        </p:nvSpPr>
-        <p:spPr>
-          <a:xfrm>
-            <a:off x="0" y="0"/>
-            <a:ext cx="9144000" cy="602780"/>
-          </a:xfrm>
-          <a:solidFill>
-            <a:srgbClr val="70121D"/>
-          </a:solidFill>
-        </p:spPr>
-        <p:txBody>
-          <a:bodyPr/>
-          <a:lstStyle/>
-          <a:p>
-            <a:pPr lvl="0" indent="0" marL="0">
-              <a:buNone/>
-            </a:pPr>
-            <a:r>
-              <a:rPr b="1"/>
-              <a:t>Lecture 5:</a:t>
-            </a:r>
-            <a:r>
-              <a:rPr/>
-              <a:t> Conducting the Two-Sample T-Test</a:t>
-            </a:r>
-          </a:p>
-        </p:txBody>
-      </p:sp>
-      <p:sp>
-        <p:nvSpPr>
-          <p:cNvPr id="3" name="Content Placeholder 2"/>
-          <p:cNvSpPr>
-            <a:spLocks noGrp="1"/>
-          </p:cNvSpPr>
-          <p:nvPr>
-            <p:ph idx="1" sz="half"/>
-          </p:nvPr>
-        </p:nvSpPr>
-        <p:spPr/>
-        <p:txBody>
-          <a:bodyPr/>
-          <a:lstStyle/>
-          <a:p>
-            <a:pPr lvl="0" indent="0" marL="0">
-              <a:buNone/>
-            </a:pPr>
-            <a:r>
-              <a:rPr/>
-              <a:t>Now we can compare the mean pine needle lengths between windward and leeward sides.</a:t>
-            </a:r>
-          </a:p>
-          <a:p>
-            <a:pPr lvl="0" indent="0" marL="0">
-              <a:buNone/>
-            </a:pPr>
-            <a:r>
-              <a:rPr/>
-              <a:t>Ho: μ₁ = μ₂ (The mean needle lengths are equal)</a:t>
-            </a:r>
-          </a:p>
-          <a:p>
-            <a:pPr lvl="0" indent="0" marL="0">
-              <a:buNone/>
-            </a:pPr>
-            <a:r>
-              <a:rPr/>
-              <a:t>Ha: μ₁ ≠ μ₂ (The mean needle lengths are different)</a:t>
-            </a:r>
-          </a:p>
-          <a:p>
-            <a:pPr lvl="0" indent="0" marL="0">
-              <a:buNone/>
-            </a:pPr>
-            <a:r>
-              <a:rPr/>
-              <a:t>Deciding between:</a:t>
-            </a:r>
-          </a:p>
-          <a:p>
-            <a:pPr lvl="0"/>
-            <a:r>
-              <a:rPr/>
-              <a:t>Standard t-test (equal variances)</a:t>
-            </a:r>
-          </a:p>
-          <a:p>
-            <a:pPr lvl="0"/>
-            <a:r>
-              <a:rPr/>
-              <a:t>Welch’s t-test (unequal variances)</a:t>
-            </a:r>
-          </a:p>
-          <a:p>
-            <a:pPr lvl="0" indent="0" marL="0">
-              <a:buNone/>
-            </a:pPr>
-            <a:r>
-              <a:rPr b="1"/>
-              <a:t>Note the Levenes Test should be NOT SIGNIFICANT - What is the null hypothesis</a:t>
-            </a:r>
-          </a:p>
-        </p:txBody>
-      </p:sp>
-      <p:sp>
-        <p:nvSpPr>
-          <p:cNvPr id="4" name="Content Placeholder 3"/>
-          <p:cNvSpPr>
-            <a:spLocks noGrp="1"/>
-          </p:cNvSpPr>
-          <p:nvPr>
-            <p:ph idx="2" sz="half"/>
-          </p:nvPr>
-        </p:nvSpPr>
-        <p:spPr/>
-        <p:txBody>
-          <a:bodyPr/>
-          <a:lstStyle/>
-          <a:p>
-            <a:pPr lvl="0" indent="0">
-              <a:buNone/>
-            </a:pPr>
-            <a:r>
-              <a:rPr>
-                <a:latin typeface="Courier"/>
-              </a:rPr>
-              <a:t>Levene's Test for Homogeneity of Variance (center = median)
-      Df F value Pr(&gt;F)
-group  1  1.2004 0.2789
-      46               </a:t>
-            </a:r>
-          </a:p>
-        </p:txBody>
-      </p:sp>
-    </p:spTree>
-  </p:cSld>
-</p:sld>
-</file>
-
-<file path=ppt/slides/slide35.xml><?xml version="1.0" encoding="utf-8"?>
-<p:sld xmlns:a="http://schemas.openxmlformats.org/drawingml/2006/main" xmlns:r="http://schemas.openxmlformats.org/officeDocument/2006/relationships" xmlns:p="http://schemas.openxmlformats.org/presentationml/2006/main">
-  <p:cSld>
-    <p:spTree>
-      <p:nvGrpSpPr>
-        <p:cNvPr id="1" name=""/>
-        <p:cNvGrpSpPr/>
-        <p:nvPr/>
-      </p:nvGrpSpPr>
-      <p:grpSpPr>
-        <a:xfrm>
-          <a:off x="0" y="0"/>
-          <a:ext cx="0" cy="0"/>
-          <a:chOff x="0" y="0"/>
-          <a:chExt cx="0" cy="0"/>
-        </a:xfrm>
-      </p:grpSpPr>
-      <p:sp>
-        <p:nvSpPr>
-          <p:cNvPr id="2" name="Title 1"/>
-          <p:cNvSpPr>
-            <a:spLocks noGrp="1"/>
-          </p:cNvSpPr>
-          <p:nvPr>
-            <p:ph type="title"/>
-          </p:nvPr>
-        </p:nvSpPr>
-        <p:spPr>
-          <a:xfrm>
-            <a:off x="0" y="0"/>
-            <a:ext cx="9144000" cy="602780"/>
-          </a:xfrm>
-          <a:solidFill>
-            <a:srgbClr val="70121D"/>
-          </a:solidFill>
-        </p:spPr>
-        <p:txBody>
-          <a:bodyPr/>
-          <a:lstStyle/>
-          <a:p>
-            <a:pPr lvl="0" indent="0" marL="0">
-              <a:buNone/>
-            </a:pPr>
-            <a:r>
-              <a:rPr b="1"/>
-              <a:t>Lecture 5:</a:t>
-            </a:r>
-            <a:r>
-              <a:rPr/>
-              <a:t> Conducting the Two-Sample T-Test</a:t>
-            </a:r>
-          </a:p>
-        </p:txBody>
-      </p:sp>
-      <p:sp>
-        <p:nvSpPr>
-          <p:cNvPr id="3" name="Content Placeholder 2"/>
-          <p:cNvSpPr>
-            <a:spLocks noGrp="1"/>
-          </p:cNvSpPr>
-          <p:nvPr>
-            <p:ph idx="1" sz="half"/>
-          </p:nvPr>
-        </p:nvSpPr>
-        <p:spPr/>
-        <p:txBody>
-          <a:bodyPr/>
-          <a:lstStyle/>
-          <a:p>
-            <a:pPr lvl="0" indent="0" marL="0">
-              <a:buNone/>
-            </a:pPr>
-            <a:r>
-              <a:rPr/>
-              <a:t>Now we can do a two sample TTEST</a:t>
-            </a:r>
-          </a:p>
-          <a:p>
-            <a:pPr lvl="0" indent="0" marL="0">
-              <a:buNone/>
-            </a:pPr>
-            <a:r>
-              <a:rPr/>
-              <a:t>Calculate t-statistic manually (optional)</a:t>
-            </a:r>
-          </a:p>
-          <a:p>
-            <a:pPr lvl="0" indent="0" marL="0">
-              <a:buNone/>
-            </a:pPr>
-            <a:r>
-              <a:rPr/>
-              <a:t>YOUR CODE HERE:</a:t>
-            </a:r>
-          </a:p>
-          <a:p>
-            <a:pPr lvl="0" indent="0" marL="0">
-              <a:buNone/>
-            </a:pPr>
-            <a:r>
-              <a:rPr/>
-              <a:t>t = (mean1 - mean2) / sqrt((s1^2/n1) + (s2^2/n2))</a:t>
-            </a:r>
-          </a:p>
-        </p:txBody>
-      </p:sp>
-      <p:sp>
-        <p:nvSpPr>
-          <p:cNvPr id="4" name="Content Placeholder 3"/>
-          <p:cNvSpPr>
-            <a:spLocks noGrp="1"/>
-          </p:cNvSpPr>
-          <p:nvPr>
-            <p:ph idx="2" sz="half"/>
-          </p:nvPr>
-        </p:nvSpPr>
-        <p:spPr/>
-        <p:txBody>
-          <a:bodyPr/>
-          <a:lstStyle/>
-          <a:p>
-            <a:pPr lvl="0" indent="0">
-              <a:buNone/>
-            </a:pPr>
-            <a:r>
-              <a:rPr>
-                <a:latin typeface="Courier"/>
-              </a:rPr>
-              <a:t>[1] "Standard two-sample t-test:"</a:t>
-            </a:r>
-          </a:p>
-          <a:p>
-            <a:pPr lvl="0" indent="0">
-              <a:buNone/>
-            </a:pPr>
-            <a:r>
-              <a:rPr>
                 <a:latin typeface="Courier"/>
               </a:rPr>
               <a:t>
@@ -7774,7 +7325,7 @@
 </p:sld>
 </file>
 
-<file path=ppt/slides/slide36.xml><?xml version="1.0" encoding="utf-8"?>
+<file path=ppt/slides/slide32.xml><?xml version="1.0" encoding="utf-8"?>
 <p:sld xmlns:a="http://schemas.openxmlformats.org/drawingml/2006/main" xmlns:r="http://schemas.openxmlformats.org/officeDocument/2006/relationships" xmlns:p="http://schemas.openxmlformats.org/presentationml/2006/main">
   <p:cSld>
     <p:spTree>
@@ -7915,7 +7466,7 @@
 </p:sld>
 </file>
 
-<file path=ppt/slides/slide37.xml><?xml version="1.0" encoding="utf-8"?>
+<file path=ppt/slides/slide33.xml><?xml version="1.0" encoding="utf-8"?>
 <p:sld xmlns:a="http://schemas.openxmlformats.org/drawingml/2006/main" xmlns:r="http://schemas.openxmlformats.org/officeDocument/2006/relationships" xmlns:p="http://schemas.openxmlformats.org/presentationml/2006/main">
   <p:cSld>
     <p:spTree>
@@ -8056,7 +7607,7 @@
 </p:sld>
 </file>
 
-<file path=ppt/slides/slide38.xml><?xml version="1.0" encoding="utf-8"?>
+<file path=ppt/slides/slide34.xml><?xml version="1.0" encoding="utf-8"?>
 <p:sld xmlns:a="http://schemas.openxmlformats.org/drawingml/2006/main" xmlns:r="http://schemas.openxmlformats.org/officeDocument/2006/relationships" xmlns:p="http://schemas.openxmlformats.org/presentationml/2006/main">
   <p:cSld>
     <p:spTree>
@@ -8086,11 +7637,8 @@
         <p:spPr>
           <a:xfrm>
             <a:off x="0" y="0"/>
-            <a:ext cx="9144000" cy="602780"/>
+            <a:ext cx="9144000" cy="582780"/>
           </a:xfrm>
-          <a:solidFill>
-            <a:srgbClr val="70121D"/>
-          </a:solidFill>
         </p:spPr>
         <p:txBody>
           <a:bodyPr/>
@@ -8117,7 +7665,7 @@
             <a:spLocks noGrp="1"/>
           </p:cNvSpPr>
           <p:nvPr>
-            <p:ph idx="1" sz="half"/>
+            <p:ph idx="1"/>
           </p:nvPr>
         </p:nvSpPr>
         <p:spPr/>
@@ -8178,22 +7726,6 @@
               <a:t>What can we do if our data violates these assumptions?</a:t>
             </a:r>
           </a:p>
-        </p:txBody>
-      </p:sp>
-      <p:sp>
-        <p:nvSpPr>
-          <p:cNvPr id="4" name="Content Placeholder 3"/>
-          <p:cNvSpPr>
-            <a:spLocks noGrp="1"/>
-          </p:cNvSpPr>
-          <p:nvPr>
-            <p:ph idx="2" sz="half"/>
-          </p:nvPr>
-        </p:nvSpPr>
-        <p:spPr/>
-        <p:txBody>
-          <a:bodyPr/>
-          <a:lstStyle/>
           <a:p>
             <a:pPr lvl="0" indent="0" marL="0">
               <a:buNone/>
@@ -8224,7 +7756,7 @@
 </p:sld>
 </file>
 
-<file path=ppt/slides/slide39.xml><?xml version="1.0" encoding="utf-8"?>
+<file path=ppt/slides/slide35.xml><?xml version="1.0" encoding="utf-8"?>
 <p:sld xmlns:a="http://schemas.openxmlformats.org/drawingml/2006/main" xmlns:r="http://schemas.openxmlformats.org/officeDocument/2006/relationships" xmlns:p="http://schemas.openxmlformats.org/presentationml/2006/main">
   <p:cSld>
     <p:spTree>
@@ -8378,6 +7910,28 @@
           </a:p>
         </p:txBody>
       </p:sp>
+    </p:spTree>
+  </p:cSld>
+</p:sld>
+</file>
+
+<file path=ppt/slides/slide36.xml><?xml version="1.0" encoding="utf-8"?>
+<p:sld xmlns:a="http://schemas.openxmlformats.org/drawingml/2006/main" xmlns:r="http://schemas.openxmlformats.org/officeDocument/2006/relationships" xmlns:p="http://schemas.openxmlformats.org/presentationml/2006/main">
+  <p:cSld>
+    <p:spTree>
+      <p:nvGrpSpPr>
+        <p:cNvPr id="1" name=""/>
+        <p:cNvGrpSpPr/>
+        <p:nvPr/>
+      </p:nvGrpSpPr>
+      <p:grpSpPr>
+        <a:xfrm>
+          <a:off x="0" y="0"/>
+          <a:ext cx="0" cy="0"/>
+          <a:chOff x="0" y="0"/>
+          <a:chExt cx="0" cy="0"/>
+        </a:xfrm>
+      </p:grpSpPr>
     </p:spTree>
   </p:cSld>
 </p:sld>
@@ -8508,28 +8062,6 @@
 </p:sld>
 </file>
 
-<file path=ppt/slides/slide40.xml><?xml version="1.0" encoding="utf-8"?>
-<p:sld xmlns:a="http://schemas.openxmlformats.org/drawingml/2006/main" xmlns:r="http://schemas.openxmlformats.org/officeDocument/2006/relationships" xmlns:p="http://schemas.openxmlformats.org/presentationml/2006/main">
-  <p:cSld>
-    <p:spTree>
-      <p:nvGrpSpPr>
-        <p:cNvPr id="1" name=""/>
-        <p:cNvGrpSpPr/>
-        <p:nvPr/>
-      </p:nvGrpSpPr>
-      <p:grpSpPr>
-        <a:xfrm>
-          <a:off x="0" y="0"/>
-          <a:ext cx="0" cy="0"/>
-          <a:chOff x="0" y="0"/>
-          <a:chExt cx="0" cy="0"/>
-        </a:xfrm>
-      </p:grpSpPr>
-    </p:spTree>
-  </p:cSld>
-</p:sld>
-</file>
-
 <file path=ppt/slides/slide5.xml><?xml version="1.0" encoding="utf-8"?>
 <p:sld xmlns:a="http://schemas.openxmlformats.org/drawingml/2006/main" xmlns:r="http://schemas.openxmlformats.org/officeDocument/2006/relationships" xmlns:p="http://schemas.openxmlformats.org/presentationml/2006/main">
   <p:cSld>
@@ -8573,6 +8105,1017 @@
               <a:t>Lecture 4: Review</a:t>
             </a:r>
           </a:p>
+          <a:p>
+            <a:pPr lvl="0"/>
+            <a:r>
+              <a:rPr/>
+              <a:t>Introduction to histograms or frequency distributions</a:t>
+            </a:r>
+          </a:p>
+          <a:p>
+            <a:pPr lvl="0"/>
+            <a:r>
+              <a:rPr/>
+              <a:t>Probability Distribution Functions (PDF)</a:t>
+            </a:r>
+          </a:p>
+          <a:p>
+            <a:pPr lvl="0"/>
+            <a:r>
+              <a:rPr/>
+              <a:t>Descriptive Statistics</a:t>
+            </a:r>
+          </a:p>
+          <a:p>
+            <a:pPr lvl="1"/>
+            <a:r>
+              <a:rPr/>
+              <a:t>Center - mean, median, mode</a:t>
+            </a:r>
+          </a:p>
+          <a:p>
+            <a:pPr lvl="1"/>
+            <a:r>
+              <a:rPr/>
+              <a:t>Spread - range, variance, standard deviation</a:t>
+            </a:r>
+          </a:p>
+        </p:txBody>
+      </p:sp>
+      <p:graphicFrame xmlns:a="http://schemas.openxmlformats.org/drawingml/2006/main" xmlns:r="http://schemas.openxmlformats.org/officeDocument/2006/relationships" xmlns:p="http://schemas.openxmlformats.org/presentationml/2006/main">
+        <p:nvGraphicFramePr>
+          <p:cNvPr id="727165567" name=""/>
+          <p:cNvGraphicFramePr>
+            <a:graphicFrameLocks noGrp="true"/>
+          </p:cNvGraphicFramePr>
+          <p:nvPr/>
+        </p:nvGraphicFramePr>
+        <p:xfrm rot="0">
+          <a:off x="914400" y="1828800"/>
+          <a:ext cx="9144000" cy="5486400"/>
+        </p:xfrm>
+        <a:graphic>
+          <a:graphicData uri="http://schemas.openxmlformats.org/drawingml/2006/table">
+            <a:tbl>
+              <a:tblPr/>
+              <a:tblGrid>
+                <a:gridCol w="685800"/>
+                <a:gridCol w="685800"/>
+                <a:gridCol w="685800"/>
+                <a:gridCol w="685800"/>
+                <a:gridCol w="685800"/>
+              </a:tblGrid>
+              <a:tr h="228600">
+                <a:tc>
+                  <a:txBody>
+                    <a:bodyPr/>
+                    <a:lstStyle/>
+                    <a:p>
+                      <a:pPr algn="l" marL="63500" marR="63500">
+                        <a:lnSpc>
+                          <a:spcPct val="100000"/>
+                        </a:lnSpc>
+                        <a:spcBef>
+                          <a:spcPts val="500"/>
+                        </a:spcBef>
+                        <a:spcAft>
+                          <a:spcPts val="500"/>
+                        </a:spcAft>
+                        <a:buNone/>
+                      </a:pPr>
+                      <a:r>
+                        <a:rPr cap="none" sz="1100" i="0" b="0" u="none">
+                          <a:solidFill>
+                            <a:srgbClr val="000000">
+                              <a:alpha val="100000"/>
+                            </a:srgbClr>
+                          </a:solidFill>
+                          <a:latin typeface="Helvetica"/>
+                          <a:cs typeface="Helvetica"/>
+                          <a:ea typeface="Helvetica"/>
+                          <a:sym typeface="Helvetica"/>
+                        </a:rPr>
+                        <a:t>lake</a:t>
+                      </a:r>
+                    </a:p>
+                  </a:txBody>
+                  <a:tcPr anchor="ctr" marB="63500" marT="63500" marR="0" marL="0">
+                    <a:lnL algn="ctr" cmpd="sng" cap="flat" w="0">
+                      <a:noFill/>
+                      <a:prstDash val="solid"/>
+                    </a:lnL>
+                    <a:lnR algn="ctr" cmpd="sng" cap="flat" w="0">
+                      <a:noFill/>
+                      <a:prstDash val="solid"/>
+                    </a:lnR>
+                    <a:lnT algn="ctr" cmpd="sng" cap="flat" w="19050">
+                      <a:solidFill>
+                        <a:srgbClr val="666666">
+                          <a:alpha val="100000"/>
+                        </a:srgbClr>
+                      </a:solidFill>
+                      <a:prstDash val="solid"/>
+                    </a:lnT>
+                    <a:lnB algn="ctr" cmpd="sng" cap="flat" w="19050">
+                      <a:solidFill>
+                        <a:srgbClr val="666666">
+                          <a:alpha val="100000"/>
+                        </a:srgbClr>
+                      </a:solidFill>
+                      <a:prstDash val="solid"/>
+                    </a:lnB>
+                    <a:solidFill>
+                      <a:srgbClr val="FFFFFF">
+                        <a:alpha val="0"/>
+                      </a:srgbClr>
+                    </a:solidFill>
+                  </a:tcPr>
+                </a:tc>
+                <a:tc>
+                  <a:txBody>
+                    <a:bodyPr/>
+                    <a:lstStyle/>
+                    <a:p>
+                      <a:pPr algn="r" marL="63500" marR="63500">
+                        <a:lnSpc>
+                          <a:spcPct val="100000"/>
+                        </a:lnSpc>
+                        <a:spcBef>
+                          <a:spcPts val="500"/>
+                        </a:spcBef>
+                        <a:spcAft>
+                          <a:spcPts val="500"/>
+                        </a:spcAft>
+                        <a:buNone/>
+                      </a:pPr>
+                      <a:r>
+                        <a:rPr cap="none" sz="1100" i="0" b="0" u="none">
+                          <a:solidFill>
+                            <a:srgbClr val="000000">
+                              <a:alpha val="100000"/>
+                            </a:srgbClr>
+                          </a:solidFill>
+                          <a:latin typeface="Helvetica"/>
+                          <a:cs typeface="Helvetica"/>
+                          <a:ea typeface="Helvetica"/>
+                          <a:sym typeface="Helvetica"/>
+                        </a:rPr>
+                        <a:t>mean_length</a:t>
+                      </a:r>
+                    </a:p>
+                  </a:txBody>
+                  <a:tcPr anchor="ctr" marB="63500" marT="63500" marR="0" marL="0">
+                    <a:lnL algn="ctr" cmpd="sng" cap="flat" w="0">
+                      <a:noFill/>
+                      <a:prstDash val="solid"/>
+                    </a:lnL>
+                    <a:lnR algn="ctr" cmpd="sng" cap="flat" w="0">
+                      <a:noFill/>
+                      <a:prstDash val="solid"/>
+                    </a:lnR>
+                    <a:lnT algn="ctr" cmpd="sng" cap="flat" w="19050">
+                      <a:solidFill>
+                        <a:srgbClr val="666666">
+                          <a:alpha val="100000"/>
+                        </a:srgbClr>
+                      </a:solidFill>
+                      <a:prstDash val="solid"/>
+                    </a:lnT>
+                    <a:lnB algn="ctr" cmpd="sng" cap="flat" w="19050">
+                      <a:solidFill>
+                        <a:srgbClr val="666666">
+                          <a:alpha val="100000"/>
+                        </a:srgbClr>
+                      </a:solidFill>
+                      <a:prstDash val="solid"/>
+                    </a:lnB>
+                    <a:solidFill>
+                      <a:srgbClr val="FFFFFF">
+                        <a:alpha val="0"/>
+                      </a:srgbClr>
+                    </a:solidFill>
+                  </a:tcPr>
+                </a:tc>
+                <a:tc>
+                  <a:txBody>
+                    <a:bodyPr/>
+                    <a:lstStyle/>
+                    <a:p>
+                      <a:pPr algn="r" marL="63500" marR="63500">
+                        <a:lnSpc>
+                          <a:spcPct val="100000"/>
+                        </a:lnSpc>
+                        <a:spcBef>
+                          <a:spcPts val="500"/>
+                        </a:spcBef>
+                        <a:spcAft>
+                          <a:spcPts val="500"/>
+                        </a:spcAft>
+                        <a:buNone/>
+                      </a:pPr>
+                      <a:r>
+                        <a:rPr cap="none" sz="1100" i="0" b="0" u="none">
+                          <a:solidFill>
+                            <a:srgbClr val="000000">
+                              <a:alpha val="100000"/>
+                            </a:srgbClr>
+                          </a:solidFill>
+                          <a:latin typeface="Helvetica"/>
+                          <a:cs typeface="Helvetica"/>
+                          <a:ea typeface="Helvetica"/>
+                          <a:sym typeface="Helvetica"/>
+                        </a:rPr>
+                        <a:t>sd_length</a:t>
+                      </a:r>
+                    </a:p>
+                  </a:txBody>
+                  <a:tcPr anchor="ctr" marB="63500" marT="63500" marR="0" marL="0">
+                    <a:lnL algn="ctr" cmpd="sng" cap="flat" w="0">
+                      <a:noFill/>
+                      <a:prstDash val="solid"/>
+                    </a:lnL>
+                    <a:lnR algn="ctr" cmpd="sng" cap="flat" w="0">
+                      <a:noFill/>
+                      <a:prstDash val="solid"/>
+                    </a:lnR>
+                    <a:lnT algn="ctr" cmpd="sng" cap="flat" w="19050">
+                      <a:solidFill>
+                        <a:srgbClr val="666666">
+                          <a:alpha val="100000"/>
+                        </a:srgbClr>
+                      </a:solidFill>
+                      <a:prstDash val="solid"/>
+                    </a:lnT>
+                    <a:lnB algn="ctr" cmpd="sng" cap="flat" w="19050">
+                      <a:solidFill>
+                        <a:srgbClr val="666666">
+                          <a:alpha val="100000"/>
+                        </a:srgbClr>
+                      </a:solidFill>
+                      <a:prstDash val="solid"/>
+                    </a:lnB>
+                    <a:solidFill>
+                      <a:srgbClr val="FFFFFF">
+                        <a:alpha val="0"/>
+                      </a:srgbClr>
+                    </a:solidFill>
+                  </a:tcPr>
+                </a:tc>
+                <a:tc>
+                  <a:txBody>
+                    <a:bodyPr/>
+                    <a:lstStyle/>
+                    <a:p>
+                      <a:pPr algn="r" marL="63500" marR="63500">
+                        <a:lnSpc>
+                          <a:spcPct val="100000"/>
+                        </a:lnSpc>
+                        <a:spcBef>
+                          <a:spcPts val="500"/>
+                        </a:spcBef>
+                        <a:spcAft>
+                          <a:spcPts val="500"/>
+                        </a:spcAft>
+                        <a:buNone/>
+                      </a:pPr>
+                      <a:r>
+                        <a:rPr cap="none" sz="1100" i="0" b="0" u="none">
+                          <a:solidFill>
+                            <a:srgbClr val="000000">
+                              <a:alpha val="100000"/>
+                            </a:srgbClr>
+                          </a:solidFill>
+                          <a:latin typeface="Helvetica"/>
+                          <a:cs typeface="Helvetica"/>
+                          <a:ea typeface="Helvetica"/>
+                          <a:sym typeface="Helvetica"/>
+                        </a:rPr>
+                        <a:t>se_length</a:t>
+                      </a:r>
+                    </a:p>
+                  </a:txBody>
+                  <a:tcPr anchor="ctr" marB="63500" marT="63500" marR="0" marL="0">
+                    <a:lnL algn="ctr" cmpd="sng" cap="flat" w="0">
+                      <a:noFill/>
+                      <a:prstDash val="solid"/>
+                    </a:lnL>
+                    <a:lnR algn="ctr" cmpd="sng" cap="flat" w="0">
+                      <a:noFill/>
+                      <a:prstDash val="solid"/>
+                    </a:lnR>
+                    <a:lnT algn="ctr" cmpd="sng" cap="flat" w="19050">
+                      <a:solidFill>
+                        <a:srgbClr val="666666">
+                          <a:alpha val="100000"/>
+                        </a:srgbClr>
+                      </a:solidFill>
+                      <a:prstDash val="solid"/>
+                    </a:lnT>
+                    <a:lnB algn="ctr" cmpd="sng" cap="flat" w="19050">
+                      <a:solidFill>
+                        <a:srgbClr val="666666">
+                          <a:alpha val="100000"/>
+                        </a:srgbClr>
+                      </a:solidFill>
+                      <a:prstDash val="solid"/>
+                    </a:lnB>
+                    <a:solidFill>
+                      <a:srgbClr val="FFFFFF">
+                        <a:alpha val="0"/>
+                      </a:srgbClr>
+                    </a:solidFill>
+                  </a:tcPr>
+                </a:tc>
+                <a:tc>
+                  <a:txBody>
+                    <a:bodyPr/>
+                    <a:lstStyle/>
+                    <a:p>
+                      <a:pPr algn="r" marL="63500" marR="63500">
+                        <a:lnSpc>
+                          <a:spcPct val="100000"/>
+                        </a:lnSpc>
+                        <a:spcBef>
+                          <a:spcPts val="500"/>
+                        </a:spcBef>
+                        <a:spcAft>
+                          <a:spcPts val="500"/>
+                        </a:spcAft>
+                        <a:buNone/>
+                      </a:pPr>
+                      <a:r>
+                        <a:rPr cap="none" sz="1100" i="0" b="0" u="none">
+                          <a:solidFill>
+                            <a:srgbClr val="000000">
+                              <a:alpha val="100000"/>
+                            </a:srgbClr>
+                          </a:solidFill>
+                          <a:latin typeface="Helvetica"/>
+                          <a:cs typeface="Helvetica"/>
+                          <a:ea typeface="Helvetica"/>
+                          <a:sym typeface="Helvetica"/>
+                        </a:rPr>
+                        <a:t>count</a:t>
+                      </a:r>
+                    </a:p>
+                  </a:txBody>
+                  <a:tcPr anchor="ctr" marB="63500" marT="63500" marR="0" marL="0">
+                    <a:lnL algn="ctr" cmpd="sng" cap="flat" w="0">
+                      <a:noFill/>
+                      <a:prstDash val="solid"/>
+                    </a:lnL>
+                    <a:lnR algn="ctr" cmpd="sng" cap="flat" w="0">
+                      <a:noFill/>
+                      <a:prstDash val="solid"/>
+                    </a:lnR>
+                    <a:lnT algn="ctr" cmpd="sng" cap="flat" w="19050">
+                      <a:solidFill>
+                        <a:srgbClr val="666666">
+                          <a:alpha val="100000"/>
+                        </a:srgbClr>
+                      </a:solidFill>
+                      <a:prstDash val="solid"/>
+                    </a:lnT>
+                    <a:lnB algn="ctr" cmpd="sng" cap="flat" w="19050">
+                      <a:solidFill>
+                        <a:srgbClr val="666666">
+                          <a:alpha val="100000"/>
+                        </a:srgbClr>
+                      </a:solidFill>
+                      <a:prstDash val="solid"/>
+                    </a:lnB>
+                    <a:solidFill>
+                      <a:srgbClr val="FFFFFF">
+                        <a:alpha val="0"/>
+                      </a:srgbClr>
+                    </a:solidFill>
+                  </a:tcPr>
+                </a:tc>
+              </a:tr>
+              <a:tr h="228600">
+                <a:tc>
+                  <a:txBody>
+                    <a:bodyPr/>
+                    <a:lstStyle/>
+                    <a:p>
+                      <a:pPr algn="l" marL="63500" marR="63500">
+                        <a:lnSpc>
+                          <a:spcPct val="100000"/>
+                        </a:lnSpc>
+                        <a:spcBef>
+                          <a:spcPts val="500"/>
+                        </a:spcBef>
+                        <a:spcAft>
+                          <a:spcPts val="500"/>
+                        </a:spcAft>
+                        <a:buNone/>
+                      </a:pPr>
+                      <a:r>
+                        <a:rPr cap="none" sz="1100" i="0" b="0" u="none">
+                          <a:solidFill>
+                            <a:srgbClr val="000000">
+                              <a:alpha val="100000"/>
+                            </a:srgbClr>
+                          </a:solidFill>
+                          <a:latin typeface="Helvetica"/>
+                          <a:cs typeface="Helvetica"/>
+                          <a:ea typeface="Helvetica"/>
+                          <a:sym typeface="Helvetica"/>
+                        </a:rPr>
+                        <a:t>I3</a:t>
+                      </a:r>
+                    </a:p>
+                  </a:txBody>
+                  <a:tcPr anchor="ctr" marB="63500" marT="63500" marR="0" marL="0">
+                    <a:lnL algn="ctr" cmpd="sng" cap="flat" w="0">
+                      <a:noFill/>
+                      <a:prstDash val="solid"/>
+                    </a:lnL>
+                    <a:lnR algn="ctr" cmpd="sng" cap="flat" w="0">
+                      <a:noFill/>
+                      <a:prstDash val="solid"/>
+                    </a:lnR>
+                    <a:lnT algn="ctr" cmpd="sng" cap="flat" w="0">
+                      <a:noFill/>
+                      <a:prstDash val="solid"/>
+                    </a:lnT>
+                    <a:lnB algn="ctr" cmpd="sng" cap="flat" w="0">
+                      <a:noFill/>
+                      <a:prstDash val="solid"/>
+                    </a:lnB>
+                    <a:solidFill>
+                      <a:srgbClr val="FFFFFF">
+                        <a:alpha val="0"/>
+                      </a:srgbClr>
+                    </a:solidFill>
+                  </a:tcPr>
+                </a:tc>
+                <a:tc>
+                  <a:txBody>
+                    <a:bodyPr/>
+                    <a:lstStyle/>
+                    <a:p>
+                      <a:pPr algn="r" marL="63500" marR="63500">
+                        <a:lnSpc>
+                          <a:spcPct val="100000"/>
+                        </a:lnSpc>
+                        <a:spcBef>
+                          <a:spcPts val="500"/>
+                        </a:spcBef>
+                        <a:spcAft>
+                          <a:spcPts val="500"/>
+                        </a:spcAft>
+                        <a:buNone/>
+                      </a:pPr>
+                      <a:r>
+                        <a:rPr cap="none" sz="1100" i="0" b="0" u="none">
+                          <a:solidFill>
+                            <a:srgbClr val="000000">
+                              <a:alpha val="100000"/>
+                            </a:srgbClr>
+                          </a:solidFill>
+                          <a:latin typeface="Helvetica"/>
+                          <a:cs typeface="Helvetica"/>
+                          <a:ea typeface="Helvetica"/>
+                          <a:sym typeface="Helvetica"/>
+                        </a:rPr>
+                        <a:t>265.6061</a:t>
+                      </a:r>
+                    </a:p>
+                  </a:txBody>
+                  <a:tcPr anchor="ctr" marB="63500" marT="63500" marR="0" marL="0">
+                    <a:lnL algn="ctr" cmpd="sng" cap="flat" w="0">
+                      <a:noFill/>
+                      <a:prstDash val="solid"/>
+                    </a:lnL>
+                    <a:lnR algn="ctr" cmpd="sng" cap="flat" w="0">
+                      <a:noFill/>
+                      <a:prstDash val="solid"/>
+                    </a:lnR>
+                    <a:lnT algn="ctr" cmpd="sng" cap="flat" w="0">
+                      <a:noFill/>
+                      <a:prstDash val="solid"/>
+                    </a:lnT>
+                    <a:lnB algn="ctr" cmpd="sng" cap="flat" w="0">
+                      <a:noFill/>
+                      <a:prstDash val="solid"/>
+                    </a:lnB>
+                    <a:solidFill>
+                      <a:srgbClr val="FFFFFF">
+                        <a:alpha val="0"/>
+                      </a:srgbClr>
+                    </a:solidFill>
+                  </a:tcPr>
+                </a:tc>
+                <a:tc>
+                  <a:txBody>
+                    <a:bodyPr/>
+                    <a:lstStyle/>
+                    <a:p>
+                      <a:pPr algn="r" marL="63500" marR="63500">
+                        <a:lnSpc>
+                          <a:spcPct val="100000"/>
+                        </a:lnSpc>
+                        <a:spcBef>
+                          <a:spcPts val="500"/>
+                        </a:spcBef>
+                        <a:spcAft>
+                          <a:spcPts val="500"/>
+                        </a:spcAft>
+                        <a:buNone/>
+                      </a:pPr>
+                      <a:r>
+                        <a:rPr cap="none" sz="1100" i="0" b="0" u="none">
+                          <a:solidFill>
+                            <a:srgbClr val="000000">
+                              <a:alpha val="100000"/>
+                            </a:srgbClr>
+                          </a:solidFill>
+                          <a:latin typeface="Helvetica"/>
+                          <a:cs typeface="Helvetica"/>
+                          <a:ea typeface="Helvetica"/>
+                          <a:sym typeface="Helvetica"/>
+                        </a:rPr>
+                        <a:t>28.30378</a:t>
+                      </a:r>
+                    </a:p>
+                  </a:txBody>
+                  <a:tcPr anchor="ctr" marB="63500" marT="63500" marR="0" marL="0">
+                    <a:lnL algn="ctr" cmpd="sng" cap="flat" w="0">
+                      <a:noFill/>
+                      <a:prstDash val="solid"/>
+                    </a:lnL>
+                    <a:lnR algn="ctr" cmpd="sng" cap="flat" w="0">
+                      <a:noFill/>
+                      <a:prstDash val="solid"/>
+                    </a:lnR>
+                    <a:lnT algn="ctr" cmpd="sng" cap="flat" w="0">
+                      <a:noFill/>
+                      <a:prstDash val="solid"/>
+                    </a:lnT>
+                    <a:lnB algn="ctr" cmpd="sng" cap="flat" w="0">
+                      <a:noFill/>
+                      <a:prstDash val="solid"/>
+                    </a:lnB>
+                    <a:solidFill>
+                      <a:srgbClr val="FFFFFF">
+                        <a:alpha val="0"/>
+                      </a:srgbClr>
+                    </a:solidFill>
+                  </a:tcPr>
+                </a:tc>
+                <a:tc>
+                  <a:txBody>
+                    <a:bodyPr/>
+                    <a:lstStyle/>
+                    <a:p>
+                      <a:pPr algn="r" marL="63500" marR="63500">
+                        <a:lnSpc>
+                          <a:spcPct val="100000"/>
+                        </a:lnSpc>
+                        <a:spcBef>
+                          <a:spcPts val="500"/>
+                        </a:spcBef>
+                        <a:spcAft>
+                          <a:spcPts val="500"/>
+                        </a:spcAft>
+                        <a:buNone/>
+                      </a:pPr>
+                      <a:r>
+                        <a:rPr cap="none" sz="1100" i="0" b="0" u="none">
+                          <a:solidFill>
+                            <a:srgbClr val="000000">
+                              <a:alpha val="100000"/>
+                            </a:srgbClr>
+                          </a:solidFill>
+                          <a:latin typeface="Helvetica"/>
+                          <a:cs typeface="Helvetica"/>
+                          <a:ea typeface="Helvetica"/>
+                          <a:sym typeface="Helvetica"/>
+                        </a:rPr>
+                        <a:t>3.483954</a:t>
+                      </a:r>
+                    </a:p>
+                  </a:txBody>
+                  <a:tcPr anchor="ctr" marB="63500" marT="63500" marR="0" marL="0">
+                    <a:lnL algn="ctr" cmpd="sng" cap="flat" w="0">
+                      <a:noFill/>
+                      <a:prstDash val="solid"/>
+                    </a:lnL>
+                    <a:lnR algn="ctr" cmpd="sng" cap="flat" w="0">
+                      <a:noFill/>
+                      <a:prstDash val="solid"/>
+                    </a:lnR>
+                    <a:lnT algn="ctr" cmpd="sng" cap="flat" w="0">
+                      <a:noFill/>
+                      <a:prstDash val="solid"/>
+                    </a:lnT>
+                    <a:lnB algn="ctr" cmpd="sng" cap="flat" w="0">
+                      <a:noFill/>
+                      <a:prstDash val="solid"/>
+                    </a:lnB>
+                    <a:solidFill>
+                      <a:srgbClr val="FFFFFF">
+                        <a:alpha val="0"/>
+                      </a:srgbClr>
+                    </a:solidFill>
+                  </a:tcPr>
+                </a:tc>
+                <a:tc>
+                  <a:txBody>
+                    <a:bodyPr/>
+                    <a:lstStyle/>
+                    <a:p>
+                      <a:pPr algn="r" marL="63500" marR="63500">
+                        <a:lnSpc>
+                          <a:spcPct val="100000"/>
+                        </a:lnSpc>
+                        <a:spcBef>
+                          <a:spcPts val="500"/>
+                        </a:spcBef>
+                        <a:spcAft>
+                          <a:spcPts val="500"/>
+                        </a:spcAft>
+                        <a:buNone/>
+                      </a:pPr>
+                      <a:r>
+                        <a:rPr cap="none" sz="1100" i="0" b="0" u="none">
+                          <a:solidFill>
+                            <a:srgbClr val="000000">
+                              <a:alpha val="100000"/>
+                            </a:srgbClr>
+                          </a:solidFill>
+                          <a:latin typeface="Helvetica"/>
+                          <a:cs typeface="Helvetica"/>
+                          <a:ea typeface="Helvetica"/>
+                          <a:sym typeface="Helvetica"/>
+                        </a:rPr>
+                        <a:t>66</a:t>
+                      </a:r>
+                    </a:p>
+                  </a:txBody>
+                  <a:tcPr anchor="ctr" marB="63500" marT="63500" marR="0" marL="0">
+                    <a:lnL algn="ctr" cmpd="sng" cap="flat" w="0">
+                      <a:noFill/>
+                      <a:prstDash val="solid"/>
+                    </a:lnL>
+                    <a:lnR algn="ctr" cmpd="sng" cap="flat" w="0">
+                      <a:noFill/>
+                      <a:prstDash val="solid"/>
+                    </a:lnR>
+                    <a:lnT algn="ctr" cmpd="sng" cap="flat" w="0">
+                      <a:noFill/>
+                      <a:prstDash val="solid"/>
+                    </a:lnT>
+                    <a:lnB algn="ctr" cmpd="sng" cap="flat" w="0">
+                      <a:noFill/>
+                      <a:prstDash val="solid"/>
+                    </a:lnB>
+                    <a:solidFill>
+                      <a:srgbClr val="FFFFFF">
+                        <a:alpha val="0"/>
+                      </a:srgbClr>
+                    </a:solidFill>
+                  </a:tcPr>
+                </a:tc>
+              </a:tr>
+              <a:tr h="228600">
+                <a:tc>
+                  <a:txBody>
+                    <a:bodyPr/>
+                    <a:lstStyle/>
+                    <a:p>
+                      <a:pPr algn="l" marL="63500" marR="63500">
+                        <a:lnSpc>
+                          <a:spcPct val="100000"/>
+                        </a:lnSpc>
+                        <a:spcBef>
+                          <a:spcPts val="500"/>
+                        </a:spcBef>
+                        <a:spcAft>
+                          <a:spcPts val="500"/>
+                        </a:spcAft>
+                        <a:buNone/>
+                      </a:pPr>
+                      <a:r>
+                        <a:rPr cap="none" sz="1100" i="0" b="0" u="none">
+                          <a:solidFill>
+                            <a:srgbClr val="000000">
+                              <a:alpha val="100000"/>
+                            </a:srgbClr>
+                          </a:solidFill>
+                          <a:latin typeface="Helvetica"/>
+                          <a:cs typeface="Helvetica"/>
+                          <a:ea typeface="Helvetica"/>
+                          <a:sym typeface="Helvetica"/>
+                        </a:rPr>
+                        <a:t>I8</a:t>
+                      </a:r>
+                    </a:p>
+                  </a:txBody>
+                  <a:tcPr anchor="ctr" marB="63500" marT="63500" marR="0" marL="0">
+                    <a:lnL algn="ctr" cmpd="sng" cap="flat" w="0">
+                      <a:noFill/>
+                      <a:prstDash val="solid"/>
+                    </a:lnL>
+                    <a:lnR algn="ctr" cmpd="sng" cap="flat" w="0">
+                      <a:noFill/>
+                      <a:prstDash val="solid"/>
+                    </a:lnR>
+                    <a:lnT algn="ctr" cmpd="sng" cap="flat" w="0">
+                      <a:noFill/>
+                      <a:prstDash val="solid"/>
+                    </a:lnT>
+                    <a:lnB algn="ctr" cmpd="sng" cap="flat" w="19050">
+                      <a:solidFill>
+                        <a:srgbClr val="666666">
+                          <a:alpha val="100000"/>
+                        </a:srgbClr>
+                      </a:solidFill>
+                      <a:prstDash val="solid"/>
+                    </a:lnB>
+                    <a:solidFill>
+                      <a:srgbClr val="FFFFFF">
+                        <a:alpha val="0"/>
+                      </a:srgbClr>
+                    </a:solidFill>
+                  </a:tcPr>
+                </a:tc>
+                <a:tc>
+                  <a:txBody>
+                    <a:bodyPr/>
+                    <a:lstStyle/>
+                    <a:p>
+                      <a:pPr algn="r" marL="63500" marR="63500">
+                        <a:lnSpc>
+                          <a:spcPct val="100000"/>
+                        </a:lnSpc>
+                        <a:spcBef>
+                          <a:spcPts val="500"/>
+                        </a:spcBef>
+                        <a:spcAft>
+                          <a:spcPts val="500"/>
+                        </a:spcAft>
+                        <a:buNone/>
+                      </a:pPr>
+                      <a:r>
+                        <a:rPr cap="none" sz="1100" i="0" b="0" u="none">
+                          <a:solidFill>
+                            <a:srgbClr val="000000">
+                              <a:alpha val="100000"/>
+                            </a:srgbClr>
+                          </a:solidFill>
+                          <a:latin typeface="Helvetica"/>
+                          <a:cs typeface="Helvetica"/>
+                          <a:ea typeface="Helvetica"/>
+                          <a:sym typeface="Helvetica"/>
+                        </a:rPr>
+                        <a:t>362.5980</a:t>
+                      </a:r>
+                    </a:p>
+                  </a:txBody>
+                  <a:tcPr anchor="ctr" marB="63500" marT="63500" marR="0" marL="0">
+                    <a:lnL algn="ctr" cmpd="sng" cap="flat" w="0">
+                      <a:noFill/>
+                      <a:prstDash val="solid"/>
+                    </a:lnL>
+                    <a:lnR algn="ctr" cmpd="sng" cap="flat" w="0">
+                      <a:noFill/>
+                      <a:prstDash val="solid"/>
+                    </a:lnR>
+                    <a:lnT algn="ctr" cmpd="sng" cap="flat" w="0">
+                      <a:noFill/>
+                      <a:prstDash val="solid"/>
+                    </a:lnT>
+                    <a:lnB algn="ctr" cmpd="sng" cap="flat" w="19050">
+                      <a:solidFill>
+                        <a:srgbClr val="666666">
+                          <a:alpha val="100000"/>
+                        </a:srgbClr>
+                      </a:solidFill>
+                      <a:prstDash val="solid"/>
+                    </a:lnB>
+                    <a:solidFill>
+                      <a:srgbClr val="FFFFFF">
+                        <a:alpha val="0"/>
+                      </a:srgbClr>
+                    </a:solidFill>
+                  </a:tcPr>
+                </a:tc>
+                <a:tc>
+                  <a:txBody>
+                    <a:bodyPr/>
+                    <a:lstStyle/>
+                    <a:p>
+                      <a:pPr algn="r" marL="63500" marR="63500">
+                        <a:lnSpc>
+                          <a:spcPct val="100000"/>
+                        </a:lnSpc>
+                        <a:spcBef>
+                          <a:spcPts val="500"/>
+                        </a:spcBef>
+                        <a:spcAft>
+                          <a:spcPts val="500"/>
+                        </a:spcAft>
+                        <a:buNone/>
+                      </a:pPr>
+                      <a:r>
+                        <a:rPr cap="none" sz="1100" i="0" b="0" u="none">
+                          <a:solidFill>
+                            <a:srgbClr val="000000">
+                              <a:alpha val="100000"/>
+                            </a:srgbClr>
+                          </a:solidFill>
+                          <a:latin typeface="Helvetica"/>
+                          <a:cs typeface="Helvetica"/>
+                          <a:ea typeface="Helvetica"/>
+                          <a:sym typeface="Helvetica"/>
+                        </a:rPr>
+                        <a:t>52.33901</a:t>
+                      </a:r>
+                    </a:p>
+                  </a:txBody>
+                  <a:tcPr anchor="ctr" marB="63500" marT="63500" marR="0" marL="0">
+                    <a:lnL algn="ctr" cmpd="sng" cap="flat" w="0">
+                      <a:noFill/>
+                      <a:prstDash val="solid"/>
+                    </a:lnL>
+                    <a:lnR algn="ctr" cmpd="sng" cap="flat" w="0">
+                      <a:noFill/>
+                      <a:prstDash val="solid"/>
+                    </a:lnR>
+                    <a:lnT algn="ctr" cmpd="sng" cap="flat" w="0">
+                      <a:noFill/>
+                      <a:prstDash val="solid"/>
+                    </a:lnT>
+                    <a:lnB algn="ctr" cmpd="sng" cap="flat" w="19050">
+                      <a:solidFill>
+                        <a:srgbClr val="666666">
+                          <a:alpha val="100000"/>
+                        </a:srgbClr>
+                      </a:solidFill>
+                      <a:prstDash val="solid"/>
+                    </a:lnB>
+                    <a:solidFill>
+                      <a:srgbClr val="FFFFFF">
+                        <a:alpha val="0"/>
+                      </a:srgbClr>
+                    </a:solidFill>
+                  </a:tcPr>
+                </a:tc>
+                <a:tc>
+                  <a:txBody>
+                    <a:bodyPr/>
+                    <a:lstStyle/>
+                    <a:p>
+                      <a:pPr algn="r" marL="63500" marR="63500">
+                        <a:lnSpc>
+                          <a:spcPct val="100000"/>
+                        </a:lnSpc>
+                        <a:spcBef>
+                          <a:spcPts val="500"/>
+                        </a:spcBef>
+                        <a:spcAft>
+                          <a:spcPts val="500"/>
+                        </a:spcAft>
+                        <a:buNone/>
+                      </a:pPr>
+                      <a:r>
+                        <a:rPr cap="none" sz="1100" i="0" b="0" u="none">
+                          <a:solidFill>
+                            <a:srgbClr val="000000">
+                              <a:alpha val="100000"/>
+                            </a:srgbClr>
+                          </a:solidFill>
+                          <a:latin typeface="Helvetica"/>
+                          <a:cs typeface="Helvetica"/>
+                          <a:ea typeface="Helvetica"/>
+                          <a:sym typeface="Helvetica"/>
+                        </a:rPr>
+                        <a:t>5.182334</a:t>
+                      </a:r>
+                    </a:p>
+                  </a:txBody>
+                  <a:tcPr anchor="ctr" marB="63500" marT="63500" marR="0" marL="0">
+                    <a:lnL algn="ctr" cmpd="sng" cap="flat" w="0">
+                      <a:noFill/>
+                      <a:prstDash val="solid"/>
+                    </a:lnL>
+                    <a:lnR algn="ctr" cmpd="sng" cap="flat" w="0">
+                      <a:noFill/>
+                      <a:prstDash val="solid"/>
+                    </a:lnR>
+                    <a:lnT algn="ctr" cmpd="sng" cap="flat" w="0">
+                      <a:noFill/>
+                      <a:prstDash val="solid"/>
+                    </a:lnT>
+                    <a:lnB algn="ctr" cmpd="sng" cap="flat" w="19050">
+                      <a:solidFill>
+                        <a:srgbClr val="666666">
+                          <a:alpha val="100000"/>
+                        </a:srgbClr>
+                      </a:solidFill>
+                      <a:prstDash val="solid"/>
+                    </a:lnB>
+                    <a:solidFill>
+                      <a:srgbClr val="FFFFFF">
+                        <a:alpha val="0"/>
+                      </a:srgbClr>
+                    </a:solidFill>
+                  </a:tcPr>
+                </a:tc>
+                <a:tc>
+                  <a:txBody>
+                    <a:bodyPr/>
+                    <a:lstStyle/>
+                    <a:p>
+                      <a:pPr algn="r" marL="63500" marR="63500">
+                        <a:lnSpc>
+                          <a:spcPct val="100000"/>
+                        </a:lnSpc>
+                        <a:spcBef>
+                          <a:spcPts val="500"/>
+                        </a:spcBef>
+                        <a:spcAft>
+                          <a:spcPts val="500"/>
+                        </a:spcAft>
+                        <a:buNone/>
+                      </a:pPr>
+                      <a:r>
+                        <a:rPr cap="none" sz="1100" i="0" b="0" u="none">
+                          <a:solidFill>
+                            <a:srgbClr val="000000">
+                              <a:alpha val="100000"/>
+                            </a:srgbClr>
+                          </a:solidFill>
+                          <a:latin typeface="Helvetica"/>
+                          <a:cs typeface="Helvetica"/>
+                          <a:ea typeface="Helvetica"/>
+                          <a:sym typeface="Helvetica"/>
+                        </a:rPr>
+                        <a:t>102</a:t>
+                      </a:r>
+                    </a:p>
+                  </a:txBody>
+                  <a:tcPr anchor="ctr" marB="63500" marT="63500" marR="0" marL="0">
+                    <a:lnL algn="ctr" cmpd="sng" cap="flat" w="0">
+                      <a:noFill/>
+                      <a:prstDash val="solid"/>
+                    </a:lnL>
+                    <a:lnR algn="ctr" cmpd="sng" cap="flat" w="0">
+                      <a:noFill/>
+                      <a:prstDash val="solid"/>
+                    </a:lnR>
+                    <a:lnT algn="ctr" cmpd="sng" cap="flat" w="0">
+                      <a:noFill/>
+                      <a:prstDash val="solid"/>
+                    </a:lnT>
+                    <a:lnB algn="ctr" cmpd="sng" cap="flat" w="19050">
+                      <a:solidFill>
+                        <a:srgbClr val="666666">
+                          <a:alpha val="100000"/>
+                        </a:srgbClr>
+                      </a:solidFill>
+                      <a:prstDash val="solid"/>
+                    </a:lnB>
+                    <a:solidFill>
+                      <a:srgbClr val="FFFFFF">
+                        <a:alpha val="0"/>
+                      </a:srgbClr>
+                    </a:solidFill>
+                  </a:tcPr>
+                </a:tc>
+              </a:tr>
+            </a:tbl>
+          </a:graphicData>
+        </a:graphic>
+      </p:graphicFrame>
+      <p:sp>
+        <p:nvSpPr>
+          <p:cNvPr id="3" name="Content Placeholder 2"/>
+          <p:cNvSpPr>
+            <a:spLocks noGrp="1"/>
+          </p:cNvSpPr>
+          <p:nvPr>
+            <p:ph idx="1"/>
+          </p:nvPr>
+        </p:nvSpPr>
+        <p:spPr/>
+        <p:txBody>
+          <a:bodyPr/>
+          <a:lstStyle/>
+          <a:p>
+            <a:pPr lvl="0" indent="0" marL="0">
+              <a:spcBef>
+                <a:spcPts val="3000"/>
+              </a:spcBef>
+              <a:buNone/>
+            </a:pPr>
+            <a:r>
+              <a:rPr b="1"/>
+              <a:t>Lecture 5: Probability and Statistical Inference</a:t>
+            </a:r>
+          </a:p>
         </p:txBody>
       </p:sp>
     </p:spTree>
@@ -8581,160 +9124,6 @@
 </file>
 
 <file path=ppt/slides/slide6.xml><?xml version="1.0" encoding="utf-8"?>
-<p:sld xmlns:a="http://schemas.openxmlformats.org/drawingml/2006/main" xmlns:r="http://schemas.openxmlformats.org/officeDocument/2006/relationships" xmlns:p="http://schemas.openxmlformats.org/presentationml/2006/main">
-  <p:cSld>
-    <p:spTree>
-      <p:nvGrpSpPr>
-        <p:cNvPr id="1" name=""/>
-        <p:cNvGrpSpPr/>
-        <p:nvPr/>
-      </p:nvGrpSpPr>
-      <p:grpSpPr>
-        <a:xfrm>
-          <a:off x="0" y="0"/>
-          <a:ext cx="0" cy="0"/>
-          <a:chOff x="0" y="0"/>
-          <a:chExt cx="0" cy="0"/>
-        </a:xfrm>
-      </p:grpSpPr>
-      <p:sp>
-        <p:nvSpPr>
-          <p:cNvPr id="3" name="Content Placeholder 2"/>
-          <p:cNvSpPr>
-            <a:spLocks noGrp="1"/>
-          </p:cNvSpPr>
-          <p:nvPr>
-            <p:ph idx="1" sz="half"/>
-          </p:nvPr>
-        </p:nvSpPr>
-        <p:spPr/>
-        <p:txBody>
-          <a:bodyPr/>
-          <a:lstStyle/>
-          <a:p>
-            <a:pPr lvl="0"/>
-            <a:r>
-              <a:rPr/>
-              <a:t>Introduction to histograms or frequency distributions</a:t>
-            </a:r>
-          </a:p>
-          <a:p>
-            <a:pPr lvl="0"/>
-            <a:r>
-              <a:rPr/>
-              <a:t>Probability Distribution Functions (PDF)</a:t>
-            </a:r>
-          </a:p>
-          <a:p>
-            <a:pPr lvl="0"/>
-            <a:r>
-              <a:rPr/>
-              <a:t>Descriptive Statistics</a:t>
-            </a:r>
-          </a:p>
-          <a:p>
-            <a:pPr lvl="1"/>
-            <a:r>
-              <a:rPr/>
-              <a:t>Center - mean, median, mode</a:t>
-            </a:r>
-          </a:p>
-          <a:p>
-            <a:pPr lvl="1"/>
-            <a:r>
-              <a:rPr/>
-              <a:t>Spread - range, variance, standard deviation</a:t>
-            </a:r>
-          </a:p>
-        </p:txBody>
-      </p:sp>
-      <p:sp>
-        <p:nvSpPr>
-          <p:cNvPr id="4" name="Content Placeholder 3"/>
-          <p:cNvSpPr>
-            <a:spLocks noGrp="1"/>
-          </p:cNvSpPr>
-          <p:nvPr>
-            <p:ph idx="2" sz="half"/>
-          </p:nvPr>
-        </p:nvSpPr>
-        <p:spPr/>
-        <p:txBody>
-          <a:bodyPr/>
-          <a:lstStyle/>
-          <a:p>
-            <a:pPr lvl="0" indent="0">
-              <a:buNone/>
-            </a:pPr>
-            <a:r>
-              <a:rPr>
-                <a:latin typeface="Courier"/>
-              </a:rPr>
-              <a:t># A tibble: 2 × 5
-  lake  mean_length sd_length se_length count
-  &lt;chr&gt;       &lt;dbl&gt;     &lt;dbl&gt;     &lt;dbl&gt; &lt;int&gt;
-1 I3           266.      28.3      3.48    66
-2 I8           363.      52.3      5.18   102</a:t>
-            </a:r>
-          </a:p>
-        </p:txBody>
-      </p:sp>
-    </p:spTree>
-  </p:cSld>
-</p:sld>
-</file>
-
-<file path=ppt/slides/slide7.xml><?xml version="1.0" encoding="utf-8"?>
-<p:sld xmlns:a="http://schemas.openxmlformats.org/drawingml/2006/main" xmlns:r="http://schemas.openxmlformats.org/officeDocument/2006/relationships" xmlns:p="http://schemas.openxmlformats.org/presentationml/2006/main">
-  <p:cSld>
-    <p:spTree>
-      <p:nvGrpSpPr>
-        <p:cNvPr id="1" name=""/>
-        <p:cNvGrpSpPr/>
-        <p:nvPr/>
-      </p:nvGrpSpPr>
-      <p:grpSpPr>
-        <a:xfrm>
-          <a:off x="0" y="0"/>
-          <a:ext cx="0" cy="0"/>
-          <a:chOff x="0" y="0"/>
-          <a:chExt cx="0" cy="0"/>
-        </a:xfrm>
-      </p:grpSpPr>
-      <p:sp>
-        <p:nvSpPr>
-          <p:cNvPr id="3" name="Content Placeholder 2"/>
-          <p:cNvSpPr>
-            <a:spLocks noGrp="1"/>
-          </p:cNvSpPr>
-          <p:nvPr>
-            <p:ph idx="1"/>
-          </p:nvPr>
-        </p:nvSpPr>
-        <p:spPr/>
-        <p:txBody>
-          <a:bodyPr/>
-          <a:lstStyle/>
-          <a:p>
-            <a:pPr lvl="0" indent="0" marL="0">
-              <a:spcBef>
-                <a:spcPts val="3000"/>
-              </a:spcBef>
-              <a:buNone/>
-            </a:pPr>
-            <a:r>
-              <a:rPr b="1"/>
-              <a:t>Lecture 5: Probability and Statistical Inference</a:t>
-            </a:r>
-          </a:p>
-        </p:txBody>
-      </p:sp>
-    </p:spTree>
-  </p:cSld>
-</p:sld>
-</file>
-
-<file path=ppt/slides/slide8.xml><?xml version="1.0" encoding="utf-8"?>
 <p:sld xmlns:a="http://schemas.openxmlformats.org/drawingml/2006/main" xmlns:r="http://schemas.openxmlformats.org/officeDocument/2006/relationships" xmlns:p="http://schemas.openxmlformats.org/presentationml/2006/main">
   <p:cSld>
     <p:spTree>
@@ -8846,6 +9235,308 @@
 </p:sld>
 </file>
 
+<file path=ppt/slides/slide7.xml><?xml version="1.0" encoding="utf-8"?>
+<p:sld xmlns:a="http://schemas.openxmlformats.org/drawingml/2006/main" xmlns:r="http://schemas.openxmlformats.org/officeDocument/2006/relationships" xmlns:p="http://schemas.openxmlformats.org/presentationml/2006/main">
+  <p:cSld>
+    <p:spTree>
+      <p:nvGrpSpPr>
+        <p:cNvPr id="1" name=""/>
+        <p:cNvGrpSpPr/>
+        <p:nvPr/>
+      </p:nvGrpSpPr>
+      <p:grpSpPr>
+        <a:xfrm>
+          <a:off x="0" y="0"/>
+          <a:ext cx="0" cy="0"/>
+          <a:chOff x="0" y="0"/>
+          <a:chExt cx="0" cy="0"/>
+        </a:xfrm>
+      </p:grpSpPr>
+      <p:sp>
+        <p:nvSpPr>
+          <p:cNvPr id="2" name="Title 1"/>
+          <p:cNvSpPr>
+            <a:spLocks noGrp="1"/>
+          </p:cNvSpPr>
+          <p:nvPr>
+            <p:ph type="title"/>
+          </p:nvPr>
+        </p:nvSpPr>
+        <p:spPr>
+          <a:xfrm>
+            <a:off x="0" y="0"/>
+            <a:ext cx="9144000" cy="582780"/>
+          </a:xfrm>
+        </p:spPr>
+        <p:txBody>
+          <a:bodyPr/>
+          <a:lstStyle/>
+          <a:p>
+            <a:pPr lvl="0" indent="0" marL="0">
+              <a:buNone/>
+            </a:pPr>
+            <a:r>
+              <a:rPr b="1"/>
+              <a:t>Lecture 5:</a:t>
+            </a:r>
+            <a:r>
+              <a:rPr/>
+              <a:t> Confidence intervals</a:t>
+            </a:r>
+          </a:p>
+        </p:txBody>
+      </p:sp>
+      <p:sp>
+        <p:nvSpPr>
+          <p:cNvPr id="3" name="Content Placeholder 2"/>
+          <p:cNvSpPr>
+            <a:spLocks noGrp="1"/>
+          </p:cNvSpPr>
+          <p:nvPr>
+            <p:ph idx="1"/>
+          </p:nvPr>
+        </p:nvSpPr>
+        <p:spPr/>
+        <p:txBody>
+          <a:bodyPr/>
+          <a:lstStyle/>
+          <a:p>
+            <a:pPr lvl="0" indent="0" marL="0">
+              <a:buNone/>
+            </a:pPr>
+            <a:r>
+              <a:rPr/>
+              <a:t>In the more typical case DON’T know the population σ or standard deviation</a:t>
+            </a:r>
+          </a:p>
+          <a:p>
+            <a:pPr lvl="0"/>
+            <a:r>
+              <a:rPr/>
+              <a:t>estimate it from the samples</a:t>
+            </a:r>
+          </a:p>
+          <a:p>
+            <a:pPr lvl="0"/>
+            <a:r>
+              <a:rPr/>
+              <a:t>and when sample size is &lt;~30)</a:t>
+            </a:r>
+          </a:p>
+          <a:p>
+            <a:pPr lvl="0"/>
+            <a:r>
+              <a:rPr/>
+              <a:t>can’t use the standard normal (z) distribution</a:t>
+            </a:r>
+          </a:p>
+          <a:p>
+            <a:pPr lvl="0" indent="0" marL="0">
+              <a:buNone/>
+            </a:pPr>
+            <a:r>
+              <a:rPr i="1"/>
+              <a:t>Instead, we use Student’s t distribution</a:t>
+            </a:r>
+          </a:p>
+          <a:p>
+            <a:pPr lvl="0" indent="0" marL="0">
+              <a:buNone/>
+            </a:pPr>
+          </a:p>
+        </p:txBody>
+      </p:sp>
+    </p:spTree>
+  </p:cSld>
+</p:sld>
+</file>
+
+<file path=ppt/slides/slide8.xml><?xml version="1.0" encoding="utf-8"?>
+<p:sld xmlns:a="http://schemas.openxmlformats.org/drawingml/2006/main" xmlns:r="http://schemas.openxmlformats.org/officeDocument/2006/relationships" xmlns:p="http://schemas.openxmlformats.org/presentationml/2006/main">
+  <p:cSld>
+    <p:spTree>
+      <p:nvGrpSpPr>
+        <p:cNvPr id="1" name=""/>
+        <p:cNvGrpSpPr/>
+        <p:nvPr/>
+      </p:nvGrpSpPr>
+      <p:grpSpPr>
+        <a:xfrm>
+          <a:off x="0" y="0"/>
+          <a:ext cx="0" cy="0"/>
+          <a:chOff x="0" y="0"/>
+          <a:chExt cx="0" cy="0"/>
+        </a:xfrm>
+      </p:grpSpPr>
+      <p:sp>
+        <p:nvSpPr>
+          <p:cNvPr id="2" name="Title 1"/>
+          <p:cNvSpPr>
+            <a:spLocks noGrp="1"/>
+          </p:cNvSpPr>
+          <p:nvPr>
+            <p:ph type="title"/>
+          </p:nvPr>
+        </p:nvSpPr>
+        <p:spPr>
+          <a:xfrm>
+            <a:off x="0" y="0"/>
+            <a:ext cx="9144000" cy="602780"/>
+          </a:xfrm>
+          <a:solidFill>
+            <a:srgbClr val="70121D"/>
+          </a:solidFill>
+        </p:spPr>
+        <p:txBody>
+          <a:bodyPr/>
+          <a:lstStyle/>
+          <a:p>
+            <a:pPr lvl="0" indent="0" marL="0">
+              <a:buNone/>
+            </a:pPr>
+            <a:r>
+              <a:rPr b="1"/>
+              <a:t>Lecture 5:</a:t>
+            </a:r>
+            <a:r>
+              <a:rPr/>
+              <a:t> Understanding t-distribution</a:t>
+            </a:r>
+          </a:p>
+        </p:txBody>
+      </p:sp>
+      <p:sp>
+        <p:nvSpPr>
+          <p:cNvPr id="3" name="Content Placeholder 2"/>
+          <p:cNvSpPr>
+            <a:spLocks noGrp="1"/>
+          </p:cNvSpPr>
+          <p:nvPr>
+            <p:ph idx="1" sz="half"/>
+          </p:nvPr>
+        </p:nvSpPr>
+        <p:spPr/>
+        <p:txBody>
+          <a:bodyPr/>
+          <a:lstStyle/>
+          <a:p>
+            <a:pPr lvl="0" indent="0" marL="0">
+              <a:buNone/>
+            </a:pPr>
+            <a:r>
+              <a:rPr/>
+              <a:t>When sample sizes are small, the </a:t>
+            </a:r>
+            <a:r>
+              <a:rPr b="1"/>
+              <a:t>t-distribution</a:t>
+            </a:r>
+            <a:r>
+              <a:rPr/>
+              <a:t> is more appropriate than the normal distribution.</a:t>
+            </a:r>
+          </a:p>
+          <a:p>
+            <a:pPr lvl="0"/>
+            <a:r>
+              <a:rPr/>
+              <a:t>Similar to normal distribution but with heavier tails</a:t>
+            </a:r>
+          </a:p>
+          <a:p>
+            <a:pPr lvl="0"/>
+            <a:r>
+              <a:rPr/>
+              <a:t>Shape depends on </a:t>
+            </a:r>
+            <a:r>
+              <a:rPr b="1"/>
+              <a:t>degrees of freedom</a:t>
+            </a:r>
+            <a:r>
+              <a:rPr/>
+              <a:t> (df = n-1)</a:t>
+            </a:r>
+          </a:p>
+          <a:p>
+            <a:pPr lvl="0"/>
+            <a:r>
+              <a:rPr/>
+              <a:t>With large df (&gt;30), approaches the normal distribution</a:t>
+            </a:r>
+          </a:p>
+          <a:p>
+            <a:pPr lvl="0"/>
+            <a:r>
+              <a:rPr/>
+              <a:t>Used for:</a:t>
+            </a:r>
+          </a:p>
+          <a:p>
+            <a:pPr lvl="1"/>
+            <a:r>
+              <a:rPr/>
+              <a:t>Small sample sizes</a:t>
+            </a:r>
+          </a:p>
+          <a:p>
+            <a:pPr lvl="1"/>
+            <a:r>
+              <a:rPr/>
+              <a:t>When population standard deviation is unknown</a:t>
+            </a:r>
+          </a:p>
+          <a:p>
+            <a:pPr lvl="1"/>
+            <a:r>
+              <a:rPr/>
+              <a:t>Calculating confidence intervals</a:t>
+            </a:r>
+          </a:p>
+          <a:p>
+            <a:pPr lvl="1"/>
+            <a:r>
+              <a:rPr/>
+              <a:t>Conducting t-tests</a:t>
+            </a:r>
+          </a:p>
+        </p:txBody>
+      </p:sp>
+      <p:pic>
+        <p:nvPicPr>
+          <p:cNvPr descr="05_01_lecture_powerpoint_files/figure-pptx/unnamed-chunk-3-1.png" id="0" name="Picture 1"/>
+          <p:cNvPicPr>
+            <a:picLocks noGrp="1" noChangeAspect="1"/>
+          </p:cNvPicPr>
+          <p:nvPr/>
+        </p:nvPicPr>
+        <p:blipFill>
+          <a:blip r:embed="rId2"/>
+          <a:stretch>
+            <a:fillRect/>
+          </a:stretch>
+        </p:blipFill>
+        <p:spPr bwMode="auto">
+          <a:xfrm>
+            <a:off x="6121400" y="1333500"/>
+            <a:ext cx="2781300" cy="3124200"/>
+          </a:xfrm>
+          <a:prstGeom prst="rect">
+            <a:avLst/>
+          </a:prstGeom>
+          <a:noFill/>
+          <a:ln w="9525">
+            <a:noFill/>
+            <a:headEnd/>
+            <a:tailEnd/>
+          </a:ln>
+        </p:spPr>
+      </p:pic>
+    </p:spTree>
+  </p:cSld>
+</p:sld>
+</file>
+
 <file path=ppt/slides/slide9.xml><?xml version="1.0" encoding="utf-8"?>
 <p:sld xmlns:a="http://schemas.openxmlformats.org/drawingml/2006/main" xmlns:r="http://schemas.openxmlformats.org/officeDocument/2006/relationships" xmlns:p="http://schemas.openxmlformats.org/presentationml/2006/main">
   <p:cSld>
@@ -8876,8 +9567,11 @@
         <p:spPr>
           <a:xfrm>
             <a:off x="0" y="0"/>
-            <a:ext cx="9144000" cy="582780"/>
+            <a:ext cx="9144000" cy="602780"/>
           </a:xfrm>
+          <a:solidFill>
+            <a:srgbClr val="70121D"/>
+          </a:solidFill>
         </p:spPr>
         <p:txBody>
           <a:bodyPr/>
@@ -8892,7 +9586,7 @@
             </a:r>
             <a:r>
               <a:rPr/>
-              <a:t> Confidence intervals</a:t>
+              <a:t> Understanding t-distribution</a:t>
             </a:r>
           </a:p>
         </p:txBody>
@@ -8904,7 +9598,7 @@
             <a:spLocks noGrp="1"/>
           </p:cNvSpPr>
           <p:nvPr>
-            <p:ph idx="1"/>
+            <p:ph idx="1" sz="half"/>
           </p:nvPr>
         </p:nvSpPr>
         <p:spPr/>
@@ -8917,46 +9611,113 @@
             </a:pPr>
             <a:r>
               <a:rPr/>
-              <a:t>In the more typical case DON’T know the population σ or standard deviation</a:t>
+              <a:t>When sample sizes are small, the </a:t>
+            </a:r>
+            <a:r>
+              <a:rPr b="1"/>
+              <a:t>t-distribution</a:t>
+            </a:r>
+            <a:r>
+              <a:rPr/>
+              <a:t> is more appropriate than the normal distribution.</a:t>
             </a:r>
           </a:p>
           <a:p>
             <a:pPr lvl="0"/>
             <a:r>
               <a:rPr/>
-              <a:t>estimate it from the samples</a:t>
+              <a:t>Similar to normal distribution (1.96 = 2.5% tails) but with heavier tails</a:t>
             </a:r>
           </a:p>
           <a:p>
             <a:pPr lvl="0"/>
             <a:r>
               <a:rPr/>
-              <a:t>and when sample size is &lt;~30)</a:t>
+              <a:t>Shape depends on </a:t>
+            </a:r>
+            <a:r>
+              <a:rPr b="1"/>
+              <a:t>degrees of freedom</a:t>
+            </a:r>
+            <a:r>
+              <a:rPr/>
+              <a:t> (df = n-1)</a:t>
             </a:r>
           </a:p>
           <a:p>
             <a:pPr lvl="0"/>
             <a:r>
               <a:rPr/>
-              <a:t>can’t use the standard normal (z) distribution</a:t>
-            </a:r>
-          </a:p>
-          <a:p>
-            <a:pPr lvl="0" indent="0" marL="0">
-              <a:buNone/>
-            </a:pPr>
-            <a:r>
-              <a:rPr i="1"/>
-              <a:t>Instead, we use Student’s t distribution</a:t>
-            </a:r>
-          </a:p>
-          <a:p>
-            <a:pPr lvl="0" indent="0" marL="0">
-              <a:buNone/>
-            </a:pPr>
-          </a:p>
-        </p:txBody>
-      </p:sp>
+              <a:t>With large df (&gt;30), approaches the normal distribution</a:t>
+            </a:r>
+          </a:p>
+          <a:p>
+            <a:pPr lvl="0"/>
+            <a:r>
+              <a:rPr/>
+              <a:t>Used for:</a:t>
+            </a:r>
+          </a:p>
+          <a:p>
+            <a:pPr lvl="1"/>
+            <a:r>
+              <a:rPr/>
+              <a:t>Small sample sizes</a:t>
+            </a:r>
+          </a:p>
+          <a:p>
+            <a:pPr lvl="1"/>
+            <a:r>
+              <a:rPr/>
+              <a:t>When population standard deviation is unknown</a:t>
+            </a:r>
+          </a:p>
+          <a:p>
+            <a:pPr lvl="1"/>
+            <a:r>
+              <a:rPr/>
+              <a:t>Calculating confidence intervals</a:t>
+            </a:r>
+          </a:p>
+          <a:p>
+            <a:pPr lvl="1"/>
+            <a:r>
+              <a:rPr/>
+              <a:t>Conducting t-tests</a:t>
+            </a:r>
+          </a:p>
+        </p:txBody>
+      </p:sp>
+      <p:pic>
+        <p:nvPicPr>
+          <p:cNvPr descr="images/clipboard-3203878802.png" id="0" name="Picture 1"/>
+          <p:cNvPicPr>
+            <a:picLocks noGrp="1" noChangeAspect="1"/>
+          </p:cNvPicPr>
+          <p:nvPr/>
+        </p:nvPicPr>
+        <p:blipFill>
+          <a:blip r:embed="rId2"/>
+          <a:stretch>
+            <a:fillRect/>
+          </a:stretch>
+        </p:blipFill>
+        <p:spPr bwMode="auto">
+          <a:xfrm>
+            <a:off x="6121400" y="1562100"/>
+            <a:ext cx="2781300" cy="2667000"/>
+          </a:xfrm>
+          <a:prstGeom prst="rect">
+            <a:avLst/>
+          </a:prstGeom>
+          <a:noFill/>
+          <a:ln w="9525">
+            <a:noFill/>
+            <a:headEnd/>
+            <a:tailEnd/>
+          </a:ln>
+        </p:spPr>
+      </p:pic>
     </p:spTree>
   </p:cSld>
 </p:sld>

</xml_diff>